<commit_message>
cleanup, alles bocht naar rechts
</commit_message>
<xml_diff>
--- a/Report/Pictures/Schematics.pptx
+++ b/Report/Pictures/Schematics.pptx
@@ -119,6 +119,9 @@
         </p14:section>
       </p14:sectionLst>
     </p:ext>
+    <p:ext uri="{EFAFB233-063F-42B5-8137-9DF3F51BA10A}">
+      <p15:sldGuideLst xmlns:p15="http://schemas.microsoft.com/office/powerpoint/2012/main"/>
+    </p:ext>
   </p:extLst>
 </p:presentation>
 </file>
@@ -205,7 +208,7 @@
           <a:p>
             <a:fld id="{8CAC89FC-C79C-4399-A322-FB5BD69CFCC8}" type="datetimeFigureOut">
               <a:rPr lang="nl-NL" smtClean="0"/>
-              <a:t>25-5-2022</a:t>
+              <a:t>7-6-2022</a:t>
             </a:fld>
             <a:endParaRPr lang="nl-NL"/>
           </a:p>
@@ -622,7 +625,7 @@
           <a:p>
             <a:fld id="{B7E8F05A-78F2-4247-8D53-7D4C0302F900}" type="datetimeFigureOut">
               <a:rPr lang="nl-NL" smtClean="0"/>
-              <a:t>25-5-2022</a:t>
+              <a:t>7-6-2022</a:t>
             </a:fld>
             <a:endParaRPr lang="nl-NL"/>
           </a:p>
@@ -822,7 +825,7 @@
           <a:p>
             <a:fld id="{B7E8F05A-78F2-4247-8D53-7D4C0302F900}" type="datetimeFigureOut">
               <a:rPr lang="nl-NL" smtClean="0"/>
-              <a:t>25-5-2022</a:t>
+              <a:t>7-6-2022</a:t>
             </a:fld>
             <a:endParaRPr lang="nl-NL"/>
           </a:p>
@@ -1032,7 +1035,7 @@
           <a:p>
             <a:fld id="{B7E8F05A-78F2-4247-8D53-7D4C0302F900}" type="datetimeFigureOut">
               <a:rPr lang="nl-NL" smtClean="0"/>
-              <a:t>25-5-2022</a:t>
+              <a:t>7-6-2022</a:t>
             </a:fld>
             <a:endParaRPr lang="nl-NL"/>
           </a:p>
@@ -1232,7 +1235,7 @@
           <a:p>
             <a:fld id="{B7E8F05A-78F2-4247-8D53-7D4C0302F900}" type="datetimeFigureOut">
               <a:rPr lang="nl-NL" smtClean="0"/>
-              <a:t>25-5-2022</a:t>
+              <a:t>7-6-2022</a:t>
             </a:fld>
             <a:endParaRPr lang="nl-NL"/>
           </a:p>
@@ -1508,7 +1511,7 @@
           <a:p>
             <a:fld id="{B7E8F05A-78F2-4247-8D53-7D4C0302F900}" type="datetimeFigureOut">
               <a:rPr lang="nl-NL" smtClean="0"/>
-              <a:t>25-5-2022</a:t>
+              <a:t>7-6-2022</a:t>
             </a:fld>
             <a:endParaRPr lang="nl-NL"/>
           </a:p>
@@ -1776,7 +1779,7 @@
           <a:p>
             <a:fld id="{B7E8F05A-78F2-4247-8D53-7D4C0302F900}" type="datetimeFigureOut">
               <a:rPr lang="nl-NL" smtClean="0"/>
-              <a:t>25-5-2022</a:t>
+              <a:t>7-6-2022</a:t>
             </a:fld>
             <a:endParaRPr lang="nl-NL"/>
           </a:p>
@@ -2191,7 +2194,7 @@
           <a:p>
             <a:fld id="{B7E8F05A-78F2-4247-8D53-7D4C0302F900}" type="datetimeFigureOut">
               <a:rPr lang="nl-NL" smtClean="0"/>
-              <a:t>25-5-2022</a:t>
+              <a:t>7-6-2022</a:t>
             </a:fld>
             <a:endParaRPr lang="nl-NL"/>
           </a:p>
@@ -2333,7 +2336,7 @@
           <a:p>
             <a:fld id="{B7E8F05A-78F2-4247-8D53-7D4C0302F900}" type="datetimeFigureOut">
               <a:rPr lang="nl-NL" smtClean="0"/>
-              <a:t>25-5-2022</a:t>
+              <a:t>7-6-2022</a:t>
             </a:fld>
             <a:endParaRPr lang="nl-NL"/>
           </a:p>
@@ -2446,7 +2449,7 @@
           <a:p>
             <a:fld id="{B7E8F05A-78F2-4247-8D53-7D4C0302F900}" type="datetimeFigureOut">
               <a:rPr lang="nl-NL" smtClean="0"/>
-              <a:t>25-5-2022</a:t>
+              <a:t>7-6-2022</a:t>
             </a:fld>
             <a:endParaRPr lang="nl-NL"/>
           </a:p>
@@ -2759,7 +2762,7 @@
           <a:p>
             <a:fld id="{B7E8F05A-78F2-4247-8D53-7D4C0302F900}" type="datetimeFigureOut">
               <a:rPr lang="nl-NL" smtClean="0"/>
-              <a:t>25-5-2022</a:t>
+              <a:t>7-6-2022</a:t>
             </a:fld>
             <a:endParaRPr lang="nl-NL"/>
           </a:p>
@@ -3048,7 +3051,7 @@
           <a:p>
             <a:fld id="{B7E8F05A-78F2-4247-8D53-7D4C0302F900}" type="datetimeFigureOut">
               <a:rPr lang="nl-NL" smtClean="0"/>
-              <a:t>25-5-2022</a:t>
+              <a:t>7-6-2022</a:t>
             </a:fld>
             <a:endParaRPr lang="nl-NL"/>
           </a:p>
@@ -3291,7 +3294,7 @@
           <a:p>
             <a:fld id="{B7E8F05A-78F2-4247-8D53-7D4C0302F900}" type="datetimeFigureOut">
               <a:rPr lang="nl-NL" smtClean="0"/>
-              <a:t>25-5-2022</a:t>
+              <a:t>7-6-2022</a:t>
             </a:fld>
             <a:endParaRPr lang="nl-NL"/>
           </a:p>
@@ -3722,10 +3725,10 @@
         </p:nvGrpSpPr>
         <p:grpSpPr>
           <a:xfrm>
-            <a:off x="1614477" y="324125"/>
-            <a:ext cx="7002473" cy="4965403"/>
+            <a:off x="1538277" y="324125"/>
+            <a:ext cx="7002473" cy="4909504"/>
             <a:chOff x="1614477" y="324125"/>
-            <a:chExt cx="7002473" cy="4965403"/>
+            <a:chExt cx="7002473" cy="4909504"/>
           </a:xfrm>
         </p:grpSpPr>
         <p:cxnSp>
@@ -4275,14 +4278,13 @@
             </p:cNvPr>
             <p:cNvCxnSpPr>
               <a:cxnSpLocks/>
-              <a:stCxn id="5" idx="2"/>
             </p:cNvCxnSpPr>
             <p:nvPr/>
           </p:nvCxnSpPr>
           <p:spPr>
             <a:xfrm flipH="1" flipV="1">
               <a:off x="5299938" y="324125"/>
-              <a:ext cx="29259" cy="4550669"/>
+              <a:ext cx="36805" cy="4834598"/>
             </a:xfrm>
             <a:prstGeom prst="line">
               <a:avLst/>
@@ -4486,6 +4488,64 @@
         </p:cxnSp>
         <p:sp>
           <p:nvSpPr>
+            <p:cNvPr id="4" name="Rectangle 3">
+              <a:extLst>
+                <a:ext uri="{FF2B5EF4-FFF2-40B4-BE49-F238E27FC236}">
+                  <a16:creationId xmlns:a16="http://schemas.microsoft.com/office/drawing/2014/main" id="{37445628-044E-AA38-059C-0BB78F57C8C1}"/>
+                </a:ext>
+              </a:extLst>
+            </p:cNvPr>
+            <p:cNvSpPr/>
+            <p:nvPr/>
+          </p:nvSpPr>
+          <p:spPr>
+            <a:xfrm rot="1639392">
+              <a:off x="2853910" y="1943099"/>
+              <a:ext cx="202112" cy="944479"/>
+            </a:xfrm>
+            <a:prstGeom prst="rect">
+              <a:avLst/>
+            </a:prstGeom>
+            <a:solidFill>
+              <a:schemeClr val="accent3">
+                <a:lumMod val="75000"/>
+              </a:schemeClr>
+            </a:solidFill>
+            <a:ln>
+              <a:solidFill>
+                <a:schemeClr val="accent3">
+                  <a:lumMod val="75000"/>
+                </a:schemeClr>
+              </a:solidFill>
+            </a:ln>
+          </p:spPr>
+          <p:style>
+            <a:lnRef idx="2">
+              <a:schemeClr val="accent1">
+                <a:shade val="50000"/>
+              </a:schemeClr>
+            </a:lnRef>
+            <a:fillRef idx="1">
+              <a:schemeClr val="accent1"/>
+            </a:fillRef>
+            <a:effectRef idx="0">
+              <a:schemeClr val="accent1"/>
+            </a:effectRef>
+            <a:fontRef idx="minor">
+              <a:schemeClr val="lt1"/>
+            </a:fontRef>
+          </p:style>
+          <p:txBody>
+            <a:bodyPr rtlCol="0" anchor="ctr"/>
+            <a:lstStyle/>
+            <a:p>
+              <a:pPr algn="ctr"/>
+              <a:endParaRPr lang="nl-NL"/>
+            </a:p>
+          </p:txBody>
+        </p:sp>
+        <p:sp>
+          <p:nvSpPr>
             <p:cNvPr id="5" name="Rectangle 4">
               <a:extLst>
                 <a:ext uri="{FF2B5EF4-FFF2-40B4-BE49-F238E27FC236}">
@@ -4539,64 +4599,6 @@
             <a:p>
               <a:pPr algn="ctr"/>
               <a:endParaRPr lang="nl-NL" dirty="0"/>
-            </a:p>
-          </p:txBody>
-        </p:sp>
-        <p:sp>
-          <p:nvSpPr>
-            <p:cNvPr id="4" name="Rectangle 3">
-              <a:extLst>
-                <a:ext uri="{FF2B5EF4-FFF2-40B4-BE49-F238E27FC236}">
-                  <a16:creationId xmlns:a16="http://schemas.microsoft.com/office/drawing/2014/main" id="{37445628-044E-AA38-059C-0BB78F57C8C1}"/>
-                </a:ext>
-              </a:extLst>
-            </p:cNvPr>
-            <p:cNvSpPr/>
-            <p:nvPr/>
-          </p:nvSpPr>
-          <p:spPr>
-            <a:xfrm rot="1639392">
-              <a:off x="2853910" y="1943099"/>
-              <a:ext cx="202112" cy="944479"/>
-            </a:xfrm>
-            <a:prstGeom prst="rect">
-              <a:avLst/>
-            </a:prstGeom>
-            <a:solidFill>
-              <a:schemeClr val="accent3">
-                <a:lumMod val="75000"/>
-              </a:schemeClr>
-            </a:solidFill>
-            <a:ln>
-              <a:solidFill>
-                <a:schemeClr val="accent3">
-                  <a:lumMod val="75000"/>
-                </a:schemeClr>
-              </a:solidFill>
-            </a:ln>
-          </p:spPr>
-          <p:style>
-            <a:lnRef idx="2">
-              <a:schemeClr val="accent1">
-                <a:shade val="50000"/>
-              </a:schemeClr>
-            </a:lnRef>
-            <a:fillRef idx="1">
-              <a:schemeClr val="accent1"/>
-            </a:fillRef>
-            <a:effectRef idx="0">
-              <a:schemeClr val="accent1"/>
-            </a:effectRef>
-            <a:fontRef idx="minor">
-              <a:schemeClr val="lt1"/>
-            </a:fontRef>
-          </p:style>
-          <p:txBody>
-            <a:bodyPr rtlCol="0" anchor="ctr"/>
-            <a:lstStyle/>
-            <a:p>
-              <a:pPr algn="ctr"/>
-              <a:endParaRPr lang="nl-NL"/>
             </a:p>
           </p:txBody>
         </p:sp>
@@ -4660,49 +4662,6 @@
         </p:sp>
         <p:cxnSp>
           <p:nvCxnSpPr>
-            <p:cNvPr id="120" name="Straight Connector 119">
-              <a:extLst>
-                <a:ext uri="{FF2B5EF4-FFF2-40B4-BE49-F238E27FC236}">
-                  <a16:creationId xmlns:a16="http://schemas.microsoft.com/office/drawing/2014/main" id="{3638D351-5189-A748-F3CF-EBC9963D9ECA}"/>
-                </a:ext>
-              </a:extLst>
-            </p:cNvPr>
-            <p:cNvCxnSpPr>
-              <a:cxnSpLocks/>
-            </p:cNvCxnSpPr>
-            <p:nvPr/>
-          </p:nvCxnSpPr>
-          <p:spPr>
-            <a:xfrm flipV="1">
-              <a:off x="4124578" y="4398274"/>
-              <a:ext cx="0" cy="770626"/>
-            </a:xfrm>
-            <a:prstGeom prst="line">
-              <a:avLst/>
-            </a:prstGeom>
-            <a:ln>
-              <a:solidFill>
-                <a:schemeClr val="tx1"/>
-              </a:solidFill>
-            </a:ln>
-          </p:spPr>
-          <p:style>
-            <a:lnRef idx="1">
-              <a:schemeClr val="accent1"/>
-            </a:lnRef>
-            <a:fillRef idx="0">
-              <a:schemeClr val="accent1"/>
-            </a:fillRef>
-            <a:effectRef idx="0">
-              <a:schemeClr val="accent1"/>
-            </a:effectRef>
-            <a:fontRef idx="minor">
-              <a:schemeClr val="tx1"/>
-            </a:fontRef>
-          </p:style>
-        </p:cxnSp>
-        <p:cxnSp>
-          <p:nvCxnSpPr>
             <p:cNvPr id="122" name="Straight Connector 121">
               <a:extLst>
                 <a:ext uri="{FF2B5EF4-FFF2-40B4-BE49-F238E27FC236}">
@@ -4760,8 +4719,8 @@
           </p:nvCxnSpPr>
           <p:spPr>
             <a:xfrm>
-              <a:off x="4124578" y="5028197"/>
-              <a:ext cx="3685799" cy="0"/>
+              <a:off x="5336743" y="5028197"/>
+              <a:ext cx="2473634" cy="0"/>
             </a:xfrm>
             <a:prstGeom prst="straightConnector1">
               <a:avLst/>
@@ -4839,7 +4798,7 @@
           </p:nvSpPr>
           <p:spPr>
             <a:xfrm>
-              <a:off x="5774155" y="5027918"/>
+              <a:off x="6456380" y="4972019"/>
               <a:ext cx="234360" cy="261610"/>
             </a:xfrm>
             <a:prstGeom prst="rect">
@@ -5056,7 +5015,7 @@
           <p:spPr>
             <a:xfrm>
               <a:off x="3299573" y="1576065"/>
-              <a:ext cx="394660" cy="261610"/>
+              <a:ext cx="393056" cy="261610"/>
             </a:xfrm>
             <a:prstGeom prst="rect">
               <a:avLst/>
@@ -5071,7 +5030,7 @@
             <a:p>
               <a:r>
                 <a:rPr lang="el-GR" sz="1100" dirty="0"/>
-                <a:t>Φ</a:t>
+                <a:t>δ </a:t>
               </a:r>
               <a:r>
                 <a:rPr lang="en-US" sz="1100" dirty="0"/>
@@ -5096,7 +5055,7 @@
           <p:spPr>
             <a:xfrm>
               <a:off x="5394720" y="363131"/>
-              <a:ext cx="412292" cy="261610"/>
+              <a:ext cx="378630" cy="261610"/>
             </a:xfrm>
             <a:prstGeom prst="rect">
               <a:avLst/>
@@ -5111,7 +5070,7 @@
             <a:p>
               <a:r>
                 <a:rPr lang="el-GR" sz="1100" dirty="0"/>
-                <a:t>Φ</a:t>
+                <a:t>δ</a:t>
               </a:r>
               <a:r>
                 <a:rPr lang="en-US" sz="1100" dirty="0"/>
@@ -5154,10 +5113,10 @@
       </p:grpSpPr>
       <p:grpSp>
         <p:nvGrpSpPr>
-          <p:cNvPr id="67" name="Group 66">
+          <p:cNvPr id="21" name="Group 20">
             <a:extLst>
               <a:ext uri="{FF2B5EF4-FFF2-40B4-BE49-F238E27FC236}">
-                <a16:creationId xmlns:a16="http://schemas.microsoft.com/office/drawing/2014/main" id="{B879891A-E51A-4B72-8180-D89FB1D5304D}"/>
+                <a16:creationId xmlns:a16="http://schemas.microsoft.com/office/drawing/2014/main" id="{111F3DC8-DFC1-8346-8CA9-ADF38CBCF70E}"/>
               </a:ext>
             </a:extLst>
           </p:cNvPr>
@@ -5166,7 +5125,7 @@
         </p:nvGrpSpPr>
         <p:grpSpPr>
           <a:xfrm>
-            <a:off x="2901663" y="922614"/>
+            <a:off x="2886423" y="949284"/>
             <a:ext cx="5523783" cy="4212595"/>
             <a:chOff x="2901663" y="922614"/>
             <a:chExt cx="5523783" cy="4212595"/>
@@ -5174,10 +5133,10 @@
         </p:grpSpPr>
         <p:grpSp>
           <p:nvGrpSpPr>
-            <p:cNvPr id="45" name="Group 44">
+            <p:cNvPr id="67" name="Group 66">
               <a:extLst>
                 <a:ext uri="{FF2B5EF4-FFF2-40B4-BE49-F238E27FC236}">
-                  <a16:creationId xmlns:a16="http://schemas.microsoft.com/office/drawing/2014/main" id="{7360103C-A46E-7CF6-9090-DD7674C3AE0B}"/>
+                  <a16:creationId xmlns:a16="http://schemas.microsoft.com/office/drawing/2014/main" id="{B879891A-E51A-4B72-8180-D89FB1D5304D}"/>
                 </a:ext>
               </a:extLst>
             </p:cNvPr>
@@ -5186,689 +5145,1800 @@
           </p:nvGrpSpPr>
           <p:grpSpPr>
             <a:xfrm>
-              <a:off x="2901663" y="1871309"/>
-              <a:ext cx="2485612" cy="3263900"/>
-              <a:chOff x="3289300" y="1136650"/>
-              <a:chExt cx="2485612" cy="3263900"/>
+              <a:off x="2901663" y="922614"/>
+              <a:ext cx="5523783" cy="4212595"/>
+              <a:chOff x="2901663" y="922614"/>
+              <a:chExt cx="5523783" cy="4212595"/>
             </a:xfrm>
           </p:grpSpPr>
-          <p:cxnSp>
-            <p:nvCxnSpPr>
-              <p:cNvPr id="18" name="Straight Connector 17">
+          <p:grpSp>
+            <p:nvGrpSpPr>
+              <p:cNvPr id="45" name="Group 44">
                 <a:extLst>
                   <a:ext uri="{FF2B5EF4-FFF2-40B4-BE49-F238E27FC236}">
-                    <a16:creationId xmlns:a16="http://schemas.microsoft.com/office/drawing/2014/main" id="{CF6E3765-0B4E-5857-8909-6B6A81D7A2FE}"/>
+                    <a16:creationId xmlns:a16="http://schemas.microsoft.com/office/drawing/2014/main" id="{7360103C-A46E-7CF6-9090-DD7674C3AE0B}"/>
                   </a:ext>
                 </a:extLst>
               </p:cNvPr>
-              <p:cNvCxnSpPr>
-                <a:cxnSpLocks/>
-              </p:cNvCxnSpPr>
+              <p:cNvGrpSpPr/>
               <p:nvPr/>
-            </p:nvCxnSpPr>
-            <p:spPr>
-              <a:xfrm flipH="1" flipV="1">
-                <a:off x="5226050" y="3028335"/>
-                <a:ext cx="477130" cy="3482"/>
+            </p:nvGrpSpPr>
+            <p:grpSpPr>
+              <a:xfrm>
+                <a:off x="2901663" y="1871309"/>
+                <a:ext cx="2485612" cy="3263900"/>
+                <a:chOff x="3289300" y="1136650"/>
+                <a:chExt cx="2485612" cy="3263900"/>
               </a:xfrm>
-              <a:prstGeom prst="line">
-                <a:avLst/>
-              </a:prstGeom>
-              <a:ln>
+            </p:grpSpPr>
+            <p:sp>
+              <p:nvSpPr>
+                <p:cNvPr id="4" name="Rectangle 3">
+                  <a:extLst>
+                    <a:ext uri="{FF2B5EF4-FFF2-40B4-BE49-F238E27FC236}">
+                      <a16:creationId xmlns:a16="http://schemas.microsoft.com/office/drawing/2014/main" id="{BC51A622-9FC4-3B1F-34ED-53A879670DCB}"/>
+                    </a:ext>
+                  </a:extLst>
+                </p:cNvPr>
+                <p:cNvSpPr/>
+                <p:nvPr/>
+              </p:nvSpPr>
+              <p:spPr>
+                <a:xfrm>
+                  <a:off x="3289300" y="1136650"/>
+                  <a:ext cx="476250" cy="3263900"/>
+                </a:xfrm>
+                <a:prstGeom prst="rect">
+                  <a:avLst/>
+                </a:prstGeom>
                 <a:solidFill>
+                  <a:schemeClr val="accent3">
+                    <a:lumMod val="60000"/>
+                    <a:lumOff val="40000"/>
+                  </a:schemeClr>
+                </a:solidFill>
+                <a:ln>
+                  <a:solidFill>
+                    <a:schemeClr val="accent3">
+                      <a:lumMod val="60000"/>
+                      <a:lumOff val="40000"/>
+                    </a:schemeClr>
+                  </a:solidFill>
+                </a:ln>
+              </p:spPr>
+              <p:style>
+                <a:lnRef idx="2">
+                  <a:schemeClr val="accent1">
+                    <a:shade val="50000"/>
+                  </a:schemeClr>
+                </a:lnRef>
+                <a:fillRef idx="1">
+                  <a:schemeClr val="accent1"/>
+                </a:fillRef>
+                <a:effectRef idx="0">
+                  <a:schemeClr val="accent1"/>
+                </a:effectRef>
+                <a:fontRef idx="minor">
+                  <a:schemeClr val="lt1"/>
+                </a:fontRef>
+              </p:style>
+              <p:txBody>
+                <a:bodyPr rtlCol="0" anchor="ctr"/>
+                <a:lstStyle/>
+                <a:p>
+                  <a:pPr algn="ctr"/>
+                  <a:endParaRPr lang="nl-NL" dirty="0"/>
+                </a:p>
+              </p:txBody>
+            </p:sp>
+            <p:sp>
+              <p:nvSpPr>
+                <p:cNvPr id="5" name="Rectangle 4">
+                  <a:extLst>
+                    <a:ext uri="{FF2B5EF4-FFF2-40B4-BE49-F238E27FC236}">
+                      <a16:creationId xmlns:a16="http://schemas.microsoft.com/office/drawing/2014/main" id="{BE9B9054-6889-6208-828D-CA5A449EEBCB}"/>
+                    </a:ext>
+                  </a:extLst>
+                </p:cNvPr>
+                <p:cNvSpPr/>
+                <p:nvPr/>
+              </p:nvSpPr>
+              <p:spPr>
+                <a:xfrm rot="2553114">
+                  <a:off x="3596059" y="3245068"/>
+                  <a:ext cx="1431213" cy="56716"/>
+                </a:xfrm>
+                <a:prstGeom prst="rect">
+                  <a:avLst/>
+                </a:prstGeom>
+              </p:spPr>
+              <p:style>
+                <a:lnRef idx="2">
+                  <a:schemeClr val="accent1">
+                    <a:shade val="50000"/>
+                  </a:schemeClr>
+                </a:lnRef>
+                <a:fillRef idx="1">
+                  <a:schemeClr val="accent1"/>
+                </a:fillRef>
+                <a:effectRef idx="0">
+                  <a:schemeClr val="accent1"/>
+                </a:effectRef>
+                <a:fontRef idx="minor">
+                  <a:schemeClr val="lt1"/>
+                </a:fontRef>
+              </p:style>
+              <p:txBody>
+                <a:bodyPr rtlCol="0" anchor="ctr"/>
+                <a:lstStyle/>
+                <a:p>
+                  <a:pPr algn="ctr"/>
+                  <a:endParaRPr lang="nl-NL"/>
+                </a:p>
+              </p:txBody>
+            </p:sp>
+            <p:sp>
+              <p:nvSpPr>
+                <p:cNvPr id="7" name="Oval 6">
+                  <a:extLst>
+                    <a:ext uri="{FF2B5EF4-FFF2-40B4-BE49-F238E27FC236}">
+                      <a16:creationId xmlns:a16="http://schemas.microsoft.com/office/drawing/2014/main" id="{1914AE53-37D8-36D4-971B-49BF68532430}"/>
+                    </a:ext>
+                  </a:extLst>
+                </p:cNvPr>
+                <p:cNvSpPr/>
+                <p:nvPr/>
+              </p:nvSpPr>
+              <p:spPr>
+                <a:xfrm>
+                  <a:off x="3702050" y="2705100"/>
+                  <a:ext cx="127000" cy="127000"/>
+                </a:xfrm>
+                <a:prstGeom prst="ellipse">
+                  <a:avLst/>
+                </a:prstGeom>
+                <a:solidFill>
+                  <a:schemeClr val="accent4"/>
+                </a:solidFill>
+              </p:spPr>
+              <p:style>
+                <a:lnRef idx="2">
+                  <a:schemeClr val="accent1">
+                    <a:shade val="50000"/>
+                  </a:schemeClr>
+                </a:lnRef>
+                <a:fillRef idx="1">
+                  <a:schemeClr val="accent1"/>
+                </a:fillRef>
+                <a:effectRef idx="0">
+                  <a:schemeClr val="accent1"/>
+                </a:effectRef>
+                <a:fontRef idx="minor">
+                  <a:schemeClr val="lt1"/>
+                </a:fontRef>
+              </p:style>
+              <p:txBody>
+                <a:bodyPr rtlCol="0" anchor="ctr"/>
+                <a:lstStyle/>
+                <a:p>
+                  <a:pPr algn="ctr"/>
+                  <a:endParaRPr lang="nl-NL"/>
+                </a:p>
+              </p:txBody>
+            </p:sp>
+            <p:sp>
+              <p:nvSpPr>
+                <p:cNvPr id="8" name="Rectangle 7">
+                  <a:extLst>
+                    <a:ext uri="{FF2B5EF4-FFF2-40B4-BE49-F238E27FC236}">
+                      <a16:creationId xmlns:a16="http://schemas.microsoft.com/office/drawing/2014/main" id="{F8CA7FF1-ED74-06E3-29E8-62C754C78CBC}"/>
+                    </a:ext>
+                  </a:extLst>
+                </p:cNvPr>
+                <p:cNvSpPr/>
+                <p:nvPr/>
+              </p:nvSpPr>
+              <p:spPr>
+                <a:xfrm rot="8162539">
+                  <a:off x="4727677" y="3383609"/>
+                  <a:ext cx="1042107" cy="45719"/>
+                </a:xfrm>
+                <a:prstGeom prst="rect">
+                  <a:avLst/>
+                </a:prstGeom>
+                <a:solidFill>
+                  <a:schemeClr val="accent2"/>
+                </a:solidFill>
+              </p:spPr>
+              <p:style>
+                <a:lnRef idx="2">
+                  <a:schemeClr val="accent1">
+                    <a:shade val="50000"/>
+                  </a:schemeClr>
+                </a:lnRef>
+                <a:fillRef idx="1">
+                  <a:schemeClr val="accent1"/>
+                </a:fillRef>
+                <a:effectRef idx="0">
+                  <a:schemeClr val="accent1"/>
+                </a:effectRef>
+                <a:fontRef idx="minor">
+                  <a:schemeClr val="lt1"/>
+                </a:fontRef>
+              </p:style>
+              <p:txBody>
+                <a:bodyPr rtlCol="0" anchor="ctr"/>
+                <a:lstStyle/>
+                <a:p>
+                  <a:pPr algn="ctr"/>
+                  <a:endParaRPr lang="nl-NL"/>
+                </a:p>
+              </p:txBody>
+            </p:sp>
+            <p:sp>
+              <p:nvSpPr>
+                <p:cNvPr id="9" name="Oval 8">
+                  <a:extLst>
+                    <a:ext uri="{FF2B5EF4-FFF2-40B4-BE49-F238E27FC236}">
+                      <a16:creationId xmlns:a16="http://schemas.microsoft.com/office/drawing/2014/main" id="{14C017B8-5C6C-267E-B4A3-0CB14928E4BE}"/>
+                    </a:ext>
+                  </a:extLst>
+                </p:cNvPr>
+                <p:cNvSpPr/>
+                <p:nvPr/>
+              </p:nvSpPr>
+              <p:spPr>
+                <a:xfrm>
+                  <a:off x="4794281" y="3714751"/>
+                  <a:ext cx="127000" cy="127000"/>
+                </a:xfrm>
+                <a:prstGeom prst="ellipse">
+                  <a:avLst/>
+                </a:prstGeom>
+                <a:solidFill>
+                  <a:schemeClr val="accent4"/>
+                </a:solidFill>
+              </p:spPr>
+              <p:style>
+                <a:lnRef idx="2">
+                  <a:schemeClr val="accent1">
+                    <a:shade val="50000"/>
+                  </a:schemeClr>
+                </a:lnRef>
+                <a:fillRef idx="1">
+                  <a:schemeClr val="accent1"/>
+                </a:fillRef>
+                <a:effectRef idx="0">
+                  <a:schemeClr val="accent1"/>
+                </a:effectRef>
+                <a:fontRef idx="minor">
+                  <a:schemeClr val="lt1"/>
+                </a:fontRef>
+              </p:style>
+              <p:txBody>
+                <a:bodyPr rtlCol="0" anchor="ctr"/>
+                <a:lstStyle/>
+                <a:p>
+                  <a:pPr algn="ctr"/>
+                  <a:endParaRPr lang="nl-NL"/>
+                </a:p>
+              </p:txBody>
+            </p:sp>
+            <p:sp>
+              <p:nvSpPr>
+                <p:cNvPr id="10" name="Oval 9">
+                  <a:extLst>
+                    <a:ext uri="{FF2B5EF4-FFF2-40B4-BE49-F238E27FC236}">
+                      <a16:creationId xmlns:a16="http://schemas.microsoft.com/office/drawing/2014/main" id="{84035177-8B4C-9265-7B26-3294FBCE9204}"/>
+                    </a:ext>
+                  </a:extLst>
+                </p:cNvPr>
+                <p:cNvSpPr/>
+                <p:nvPr/>
+              </p:nvSpPr>
+              <p:spPr>
+                <a:xfrm>
+                  <a:off x="5577060" y="2964835"/>
+                  <a:ext cx="127000" cy="127000"/>
+                </a:xfrm>
+                <a:prstGeom prst="ellipse">
+                  <a:avLst/>
+                </a:prstGeom>
+                <a:solidFill>
+                  <a:schemeClr val="accent4"/>
+                </a:solidFill>
+              </p:spPr>
+              <p:style>
+                <a:lnRef idx="2">
+                  <a:schemeClr val="accent1">
+                    <a:shade val="50000"/>
+                  </a:schemeClr>
+                </a:lnRef>
+                <a:fillRef idx="1">
+                  <a:schemeClr val="accent1"/>
+                </a:fillRef>
+                <a:effectRef idx="0">
+                  <a:schemeClr val="accent1"/>
+                </a:effectRef>
+                <a:fontRef idx="minor">
+                  <a:schemeClr val="lt1"/>
+                </a:fontRef>
+              </p:style>
+              <p:txBody>
+                <a:bodyPr rtlCol="0" anchor="ctr"/>
+                <a:lstStyle/>
+                <a:p>
+                  <a:pPr algn="ctr"/>
+                  <a:endParaRPr lang="nl-NL"/>
+                </a:p>
+              </p:txBody>
+            </p:sp>
+            <p:cxnSp>
+              <p:nvCxnSpPr>
+                <p:cNvPr id="11" name="Straight Connector 10">
+                  <a:extLst>
+                    <a:ext uri="{FF2B5EF4-FFF2-40B4-BE49-F238E27FC236}">
+                      <a16:creationId xmlns:a16="http://schemas.microsoft.com/office/drawing/2014/main" id="{F92E8DDA-000A-A618-17BB-B58BD44A7C95}"/>
+                    </a:ext>
+                  </a:extLst>
+                </p:cNvPr>
+                <p:cNvCxnSpPr>
+                  <a:cxnSpLocks/>
+                  <a:endCxn id="9" idx="6"/>
+                </p:cNvCxnSpPr>
+                <p:nvPr/>
+              </p:nvCxnSpPr>
+              <p:spPr>
+                <a:xfrm flipH="1">
+                  <a:off x="4921281" y="3766166"/>
+                  <a:ext cx="781899" cy="12085"/>
+                </a:xfrm>
+                <a:prstGeom prst="line">
+                  <a:avLst/>
+                </a:prstGeom>
+                <a:ln>
+                  <a:solidFill>
+                    <a:schemeClr val="tx1"/>
+                  </a:solidFill>
+                </a:ln>
+              </p:spPr>
+              <p:style>
+                <a:lnRef idx="1">
+                  <a:schemeClr val="accent1"/>
+                </a:lnRef>
+                <a:fillRef idx="0">
+                  <a:schemeClr val="accent1"/>
+                </a:fillRef>
+                <a:effectRef idx="0">
+                  <a:schemeClr val="accent1"/>
+                </a:effectRef>
+                <a:fontRef idx="minor">
                   <a:schemeClr val="tx1"/>
-                </a:solidFill>
-              </a:ln>
-            </p:spPr>
-            <p:style>
-              <a:lnRef idx="1">
-                <a:schemeClr val="accent1"/>
-              </a:lnRef>
-              <a:fillRef idx="0">
-                <a:schemeClr val="accent1"/>
-              </a:fillRef>
-              <a:effectRef idx="0">
-                <a:schemeClr val="accent1"/>
-              </a:effectRef>
-              <a:fontRef idx="minor">
-                <a:schemeClr val="tx1"/>
-              </a:fontRef>
-            </p:style>
-          </p:cxnSp>
-          <p:sp>
-            <p:nvSpPr>
-              <p:cNvPr id="4" name="Rectangle 3">
+                </a:fontRef>
+              </p:style>
+            </p:cxnSp>
+            <p:sp>
+              <p:nvSpPr>
+                <p:cNvPr id="12" name="Arc 11">
+                  <a:extLst>
+                    <a:ext uri="{FF2B5EF4-FFF2-40B4-BE49-F238E27FC236}">
+                      <a16:creationId xmlns:a16="http://schemas.microsoft.com/office/drawing/2014/main" id="{735845CD-7056-B650-5C3F-3C28B5F4FDA0}"/>
+                    </a:ext>
+                  </a:extLst>
+                </p:cNvPr>
+                <p:cNvSpPr/>
+                <p:nvPr/>
+              </p:nvSpPr>
+              <p:spPr>
+                <a:xfrm rot="330772">
+                  <a:off x="4454600" y="3185941"/>
+                  <a:ext cx="1029298" cy="1057620"/>
+                </a:xfrm>
+                <a:prstGeom prst="arc">
+                  <a:avLst>
+                    <a:gd name="adj1" fmla="val 18598375"/>
+                    <a:gd name="adj2" fmla="val 72582"/>
+                  </a:avLst>
+                </a:prstGeom>
+                <a:noFill/>
+                <a:ln>
+                  <a:solidFill>
+                    <a:schemeClr val="tx1"/>
+                  </a:solidFill>
+                </a:ln>
+              </p:spPr>
+              <p:style>
+                <a:lnRef idx="1">
+                  <a:schemeClr val="accent1"/>
+                </a:lnRef>
+                <a:fillRef idx="0">
+                  <a:schemeClr val="accent1"/>
+                </a:fillRef>
+                <a:effectRef idx="0">
+                  <a:schemeClr val="accent1"/>
+                </a:effectRef>
+                <a:fontRef idx="minor">
+                  <a:schemeClr val="tx1"/>
+                </a:fontRef>
+              </p:style>
+              <p:txBody>
+                <a:bodyPr rtlCol="0" anchor="ctr"/>
+                <a:lstStyle/>
+                <a:p>
+                  <a:pPr algn="ctr"/>
+                  <a:endParaRPr lang="nl-NL"/>
+                </a:p>
+              </p:txBody>
+            </p:sp>
+            <p:cxnSp>
+              <p:nvCxnSpPr>
+                <p:cNvPr id="15" name="Straight Connector 14">
+                  <a:extLst>
+                    <a:ext uri="{FF2B5EF4-FFF2-40B4-BE49-F238E27FC236}">
+                      <a16:creationId xmlns:a16="http://schemas.microsoft.com/office/drawing/2014/main" id="{B80B9A7A-66A6-199A-81B6-255CCC0D91A8}"/>
+                    </a:ext>
+                  </a:extLst>
+                </p:cNvPr>
+                <p:cNvCxnSpPr>
+                  <a:cxnSpLocks/>
+                  <a:endCxn id="7" idx="6"/>
+                </p:cNvCxnSpPr>
+                <p:nvPr/>
+              </p:nvCxnSpPr>
+              <p:spPr>
+                <a:xfrm flipH="1">
+                  <a:off x="3829050" y="2768600"/>
+                  <a:ext cx="1581150" cy="0"/>
+                </a:xfrm>
+                <a:prstGeom prst="line">
+                  <a:avLst/>
+                </a:prstGeom>
+                <a:ln>
+                  <a:solidFill>
+                    <a:schemeClr val="tx1"/>
+                  </a:solidFill>
+                </a:ln>
+              </p:spPr>
+              <p:style>
+                <a:lnRef idx="1">
+                  <a:schemeClr val="accent1"/>
+                </a:lnRef>
+                <a:fillRef idx="0">
+                  <a:schemeClr val="accent1"/>
+                </a:fillRef>
+                <a:effectRef idx="0">
+                  <a:schemeClr val="accent1"/>
+                </a:effectRef>
+                <a:fontRef idx="minor">
+                  <a:schemeClr val="tx1"/>
+                </a:fontRef>
+              </p:style>
+            </p:cxnSp>
+            <p:sp>
+              <p:nvSpPr>
+                <p:cNvPr id="16" name="Arc 15">
+                  <a:extLst>
+                    <a:ext uri="{FF2B5EF4-FFF2-40B4-BE49-F238E27FC236}">
+                      <a16:creationId xmlns:a16="http://schemas.microsoft.com/office/drawing/2014/main" id="{0FC2920A-4686-F6D5-8C39-8182579BF6A6}"/>
+                    </a:ext>
+                  </a:extLst>
+                </p:cNvPr>
+                <p:cNvSpPr/>
+                <p:nvPr/>
+              </p:nvSpPr>
+              <p:spPr>
+                <a:xfrm rot="2657196">
+                  <a:off x="3377259" y="2277890"/>
+                  <a:ext cx="1029298" cy="1057620"/>
+                </a:xfrm>
+                <a:prstGeom prst="arc">
+                  <a:avLst>
+                    <a:gd name="adj1" fmla="val 18723404"/>
+                    <a:gd name="adj2" fmla="val 72582"/>
+                  </a:avLst>
+                </a:prstGeom>
+                <a:noFill/>
+                <a:ln>
+                  <a:solidFill>
+                    <a:schemeClr val="tx1"/>
+                  </a:solidFill>
+                </a:ln>
+              </p:spPr>
+              <p:style>
+                <a:lnRef idx="1">
+                  <a:schemeClr val="accent1"/>
+                </a:lnRef>
+                <a:fillRef idx="0">
+                  <a:schemeClr val="accent1"/>
+                </a:fillRef>
+                <a:effectRef idx="0">
+                  <a:schemeClr val="accent1"/>
+                </a:effectRef>
+                <a:fontRef idx="minor">
+                  <a:schemeClr val="tx1"/>
+                </a:fontRef>
+              </p:style>
+              <p:txBody>
+                <a:bodyPr rtlCol="0" anchor="ctr"/>
+                <a:lstStyle/>
+                <a:p>
+                  <a:pPr algn="ctr"/>
+                  <a:endParaRPr lang="nl-NL"/>
+                </a:p>
+              </p:txBody>
+            </p:sp>
+            <p:cxnSp>
+              <p:nvCxnSpPr>
+                <p:cNvPr id="30" name="Straight Connector 29">
+                  <a:extLst>
+                    <a:ext uri="{FF2B5EF4-FFF2-40B4-BE49-F238E27FC236}">
+                      <a16:creationId xmlns:a16="http://schemas.microsoft.com/office/drawing/2014/main" id="{B8A034A7-FF88-5563-4250-0DEE2CBAEFB9}"/>
+                    </a:ext>
+                  </a:extLst>
+                </p:cNvPr>
+                <p:cNvCxnSpPr>
+                  <a:cxnSpLocks/>
+                  <a:stCxn id="10" idx="0"/>
+                </p:cNvCxnSpPr>
+                <p:nvPr/>
+              </p:nvCxnSpPr>
+              <p:spPr>
+                <a:xfrm flipH="1" flipV="1">
+                  <a:off x="5639680" y="2376796"/>
+                  <a:ext cx="880" cy="588039"/>
+                </a:xfrm>
+                <a:prstGeom prst="line">
+                  <a:avLst/>
+                </a:prstGeom>
+                <a:ln>
+                  <a:solidFill>
+                    <a:schemeClr val="tx1"/>
+                  </a:solidFill>
+                </a:ln>
+              </p:spPr>
+              <p:style>
+                <a:lnRef idx="1">
+                  <a:schemeClr val="accent1"/>
+                </a:lnRef>
+                <a:fillRef idx="0">
+                  <a:schemeClr val="accent1"/>
+                </a:fillRef>
+                <a:effectRef idx="0">
+                  <a:schemeClr val="accent1"/>
+                </a:effectRef>
+                <a:fontRef idx="minor">
+                  <a:schemeClr val="tx1"/>
+                </a:fontRef>
+              </p:style>
+            </p:cxnSp>
+            <p:cxnSp>
+              <p:nvCxnSpPr>
+                <p:cNvPr id="35" name="Straight Arrow Connector 34">
+                  <a:extLst>
+                    <a:ext uri="{FF2B5EF4-FFF2-40B4-BE49-F238E27FC236}">
+                      <a16:creationId xmlns:a16="http://schemas.microsoft.com/office/drawing/2014/main" id="{FB7E2EE0-2DED-100C-2700-30828F31A1CA}"/>
+                    </a:ext>
+                  </a:extLst>
+                </p:cNvPr>
+                <p:cNvCxnSpPr>
+                  <a:cxnSpLocks/>
+                </p:cNvCxnSpPr>
+                <p:nvPr/>
+              </p:nvCxnSpPr>
+              <p:spPr>
+                <a:xfrm flipH="1">
+                  <a:off x="3765325" y="2492991"/>
+                  <a:ext cx="1874355" cy="0"/>
+                </a:xfrm>
+                <a:prstGeom prst="straightConnector1">
+                  <a:avLst/>
+                </a:prstGeom>
+                <a:ln>
+                  <a:solidFill>
+                    <a:schemeClr val="tx1"/>
+                  </a:solidFill>
+                  <a:headEnd type="triangle"/>
+                  <a:tailEnd type="triangle"/>
+                </a:ln>
+              </p:spPr>
+              <p:style>
+                <a:lnRef idx="1">
+                  <a:schemeClr val="accent1"/>
+                </a:lnRef>
+                <a:fillRef idx="0">
+                  <a:schemeClr val="accent1"/>
+                </a:fillRef>
+                <a:effectRef idx="0">
+                  <a:schemeClr val="accent1"/>
+                </a:effectRef>
+                <a:fontRef idx="minor">
+                  <a:schemeClr val="tx1"/>
+                </a:fontRef>
+              </p:style>
+            </p:cxnSp>
+            <p:sp>
+              <p:nvSpPr>
+                <p:cNvPr id="39" name="TextBox 38">
+                  <a:extLst>
+                    <a:ext uri="{FF2B5EF4-FFF2-40B4-BE49-F238E27FC236}">
+                      <a16:creationId xmlns:a16="http://schemas.microsoft.com/office/drawing/2014/main" id="{539B31BE-E992-6FD7-CA60-397E9F08E2D0}"/>
+                    </a:ext>
+                  </a:extLst>
+                </p:cNvPr>
+                <p:cNvSpPr txBox="1"/>
+                <p:nvPr/>
+              </p:nvSpPr>
+              <p:spPr>
+                <a:xfrm>
+                  <a:off x="4013200" y="3321050"/>
+                  <a:ext cx="341760" cy="261610"/>
+                </a:xfrm>
+                <a:prstGeom prst="rect">
+                  <a:avLst/>
+                </a:prstGeom>
+                <a:noFill/>
+              </p:spPr>
+              <p:txBody>
+                <a:bodyPr wrap="none" rtlCol="0">
+                  <a:spAutoFit/>
+                </a:bodyPr>
+                <a:lstStyle/>
+                <a:p>
+                  <a:r>
+                    <a:rPr lang="en-US" sz="1100" dirty="0" err="1"/>
+                    <a:t>s_l</a:t>
+                  </a:r>
+                  <a:endParaRPr lang="nl-NL" sz="1100" dirty="0"/>
+                </a:p>
+              </p:txBody>
+            </p:sp>
+            <p:sp>
+              <p:nvSpPr>
+                <p:cNvPr id="40" name="TextBox 39">
+                  <a:extLst>
+                    <a:ext uri="{FF2B5EF4-FFF2-40B4-BE49-F238E27FC236}">
+                      <a16:creationId xmlns:a16="http://schemas.microsoft.com/office/drawing/2014/main" id="{EB78CACE-E3DE-42AE-03C6-A234855E8D2C}"/>
+                    </a:ext>
+                  </a:extLst>
+                </p:cNvPr>
+                <p:cNvSpPr txBox="1"/>
+                <p:nvPr/>
+              </p:nvSpPr>
+              <p:spPr>
+                <a:xfrm>
+                  <a:off x="4921281" y="3167391"/>
+                  <a:ext cx="333746" cy="261610"/>
+                </a:xfrm>
+                <a:prstGeom prst="rect">
+                  <a:avLst/>
+                </a:prstGeom>
+                <a:noFill/>
+              </p:spPr>
+              <p:txBody>
+                <a:bodyPr wrap="none" rtlCol="0">
+                  <a:spAutoFit/>
+                </a:bodyPr>
+                <a:lstStyle/>
+                <a:p>
+                  <a:r>
+                    <a:rPr lang="en-US" sz="1100" dirty="0" err="1"/>
+                    <a:t>t_l</a:t>
+                  </a:r>
+                  <a:endParaRPr lang="nl-NL" sz="1100" dirty="0"/>
+                </a:p>
+              </p:txBody>
+            </p:sp>
+            <p:sp>
+              <p:nvSpPr>
+                <p:cNvPr id="41" name="TextBox 40">
+                  <a:extLst>
+                    <a:ext uri="{FF2B5EF4-FFF2-40B4-BE49-F238E27FC236}">
+                      <a16:creationId xmlns:a16="http://schemas.microsoft.com/office/drawing/2014/main" id="{D5CE6D56-55F6-5AA9-1FAF-6389F55FE75B}"/>
+                    </a:ext>
+                  </a:extLst>
+                </p:cNvPr>
+                <p:cNvSpPr txBox="1"/>
+                <p:nvPr/>
+              </p:nvSpPr>
+              <p:spPr>
+                <a:xfrm>
+                  <a:off x="4305931" y="2879210"/>
+                  <a:ext cx="367408" cy="261610"/>
+                </a:xfrm>
+                <a:prstGeom prst="rect">
+                  <a:avLst/>
+                </a:prstGeom>
+                <a:noFill/>
+              </p:spPr>
+              <p:txBody>
+                <a:bodyPr wrap="none" rtlCol="0">
+                  <a:spAutoFit/>
+                </a:bodyPr>
+                <a:lstStyle/>
+                <a:p>
+                  <a:r>
+                    <a:rPr lang="en-US" sz="1100" dirty="0"/>
+                    <a:t>α_l</a:t>
+                  </a:r>
+                  <a:endParaRPr lang="nl-NL" sz="1100" dirty="0"/>
+                </a:p>
+              </p:txBody>
+            </p:sp>
+            <p:sp>
+              <p:nvSpPr>
+                <p:cNvPr id="42" name="TextBox 41">
+                  <a:extLst>
+                    <a:ext uri="{FF2B5EF4-FFF2-40B4-BE49-F238E27FC236}">
+                      <a16:creationId xmlns:a16="http://schemas.microsoft.com/office/drawing/2014/main" id="{D2E25F9E-DA26-9A9A-E3BC-7DB12AEC21C0}"/>
+                    </a:ext>
+                  </a:extLst>
+                </p:cNvPr>
+                <p:cNvSpPr txBox="1"/>
+                <p:nvPr/>
+              </p:nvSpPr>
+              <p:spPr>
+                <a:xfrm>
+                  <a:off x="5412312" y="3392649"/>
+                  <a:ext cx="362600" cy="261610"/>
+                </a:xfrm>
+                <a:prstGeom prst="rect">
+                  <a:avLst/>
+                </a:prstGeom>
+                <a:noFill/>
+              </p:spPr>
+              <p:txBody>
+                <a:bodyPr wrap="none" rtlCol="0">
+                  <a:spAutoFit/>
+                </a:bodyPr>
+                <a:lstStyle/>
+                <a:p>
+                  <a:r>
+                    <a:rPr lang="el-GR" sz="1100" dirty="0"/>
+                    <a:t>β</a:t>
+                  </a:r>
+                  <a:r>
+                    <a:rPr lang="en-US" sz="1100" dirty="0"/>
+                    <a:t>_l</a:t>
+                  </a:r>
+                  <a:endParaRPr lang="nl-NL" sz="1100" dirty="0"/>
+                </a:p>
+              </p:txBody>
+            </p:sp>
+            <p:sp>
+              <p:nvSpPr>
+                <p:cNvPr id="44" name="TextBox 43">
+                  <a:extLst>
+                    <a:ext uri="{FF2B5EF4-FFF2-40B4-BE49-F238E27FC236}">
+                      <a16:creationId xmlns:a16="http://schemas.microsoft.com/office/drawing/2014/main" id="{512C28A6-4434-0925-9E61-9DC15ACE650F}"/>
+                    </a:ext>
+                  </a:extLst>
+                </p:cNvPr>
+                <p:cNvSpPr txBox="1"/>
+                <p:nvPr/>
+              </p:nvSpPr>
+              <p:spPr>
+                <a:xfrm>
+                  <a:off x="4526813" y="2239109"/>
+                  <a:ext cx="317716" cy="261610"/>
+                </a:xfrm>
+                <a:prstGeom prst="rect">
+                  <a:avLst/>
+                </a:prstGeom>
+                <a:noFill/>
+              </p:spPr>
+              <p:txBody>
+                <a:bodyPr wrap="none" rtlCol="0">
+                  <a:spAutoFit/>
+                </a:bodyPr>
+                <a:lstStyle/>
+                <a:p>
+                  <a:r>
+                    <a:rPr lang="en-US" sz="1100" dirty="0"/>
+                    <a:t>ST</a:t>
+                  </a:r>
+                  <a:endParaRPr lang="nl-NL" sz="1100" dirty="0"/>
+                </a:p>
+              </p:txBody>
+            </p:sp>
+          </p:grpSp>
+          <p:grpSp>
+            <p:nvGrpSpPr>
+              <p:cNvPr id="46" name="Group 45">
                 <a:extLst>
                   <a:ext uri="{FF2B5EF4-FFF2-40B4-BE49-F238E27FC236}">
-                    <a16:creationId xmlns:a16="http://schemas.microsoft.com/office/drawing/2014/main" id="{BC51A622-9FC4-3B1F-34ED-53A879670DCB}"/>
+                    <a16:creationId xmlns:a16="http://schemas.microsoft.com/office/drawing/2014/main" id="{66D85E1D-B809-AC98-8A25-DD3D6F2B00C8}"/>
                   </a:ext>
                 </a:extLst>
               </p:cNvPr>
-              <p:cNvSpPr/>
+              <p:cNvGrpSpPr/>
               <p:nvPr/>
-            </p:nvSpPr>
-            <p:spPr>
-              <a:xfrm>
-                <a:off x="3289300" y="1136650"/>
-                <a:ext cx="476250" cy="3263900"/>
+            </p:nvGrpSpPr>
+            <p:grpSpPr>
+              <a:xfrm flipH="1">
+                <a:off x="5939834" y="922614"/>
+                <a:ext cx="2485612" cy="3263900"/>
+                <a:chOff x="3289300" y="1136650"/>
+                <a:chExt cx="2485612" cy="3263900"/>
               </a:xfrm>
-              <a:prstGeom prst="rect">
-                <a:avLst/>
-              </a:prstGeom>
-              <a:solidFill>
-                <a:schemeClr val="accent3">
-                  <a:lumMod val="75000"/>
-                </a:schemeClr>
-              </a:solidFill>
-              <a:ln>
+            </p:grpSpPr>
+            <p:sp>
+              <p:nvSpPr>
+                <p:cNvPr id="48" name="Rectangle 47">
+                  <a:extLst>
+                    <a:ext uri="{FF2B5EF4-FFF2-40B4-BE49-F238E27FC236}">
+                      <a16:creationId xmlns:a16="http://schemas.microsoft.com/office/drawing/2014/main" id="{7D334D42-B0D5-9FEA-054E-AEB366B00383}"/>
+                    </a:ext>
+                  </a:extLst>
+                </p:cNvPr>
+                <p:cNvSpPr/>
+                <p:nvPr/>
+              </p:nvSpPr>
+              <p:spPr>
+                <a:xfrm>
+                  <a:off x="3289300" y="1136650"/>
+                  <a:ext cx="476250" cy="3263900"/>
+                </a:xfrm>
+                <a:prstGeom prst="rect">
+                  <a:avLst/>
+                </a:prstGeom>
                 <a:solidFill>
                   <a:schemeClr val="accent3">
-                    <a:lumMod val="75000"/>
+                    <a:lumMod val="60000"/>
+                    <a:lumOff val="40000"/>
                   </a:schemeClr>
                 </a:solidFill>
-              </a:ln>
-            </p:spPr>
-            <p:style>
-              <a:lnRef idx="2">
-                <a:schemeClr val="accent1">
-                  <a:shade val="50000"/>
-                </a:schemeClr>
-              </a:lnRef>
-              <a:fillRef idx="1">
-                <a:schemeClr val="accent1"/>
-              </a:fillRef>
-              <a:effectRef idx="0">
-                <a:schemeClr val="accent1"/>
-              </a:effectRef>
-              <a:fontRef idx="minor">
-                <a:schemeClr val="lt1"/>
-              </a:fontRef>
-            </p:style>
-            <p:txBody>
-              <a:bodyPr rtlCol="0" anchor="ctr"/>
-              <a:lstStyle/>
-              <a:p>
-                <a:pPr algn="ctr"/>
-                <a:endParaRPr lang="nl-NL"/>
-              </a:p>
-            </p:txBody>
-          </p:sp>
-          <p:sp>
-            <p:nvSpPr>
-              <p:cNvPr id="5" name="Rectangle 4">
+                <a:ln>
+                  <a:solidFill>
+                    <a:schemeClr val="accent3">
+                      <a:lumMod val="60000"/>
+                      <a:lumOff val="40000"/>
+                    </a:schemeClr>
+                  </a:solidFill>
+                </a:ln>
+              </p:spPr>
+              <p:style>
+                <a:lnRef idx="2">
+                  <a:schemeClr val="accent1">
+                    <a:shade val="50000"/>
+                  </a:schemeClr>
+                </a:lnRef>
+                <a:fillRef idx="1">
+                  <a:schemeClr val="accent1"/>
+                </a:fillRef>
+                <a:effectRef idx="0">
+                  <a:schemeClr val="accent1"/>
+                </a:effectRef>
+                <a:fontRef idx="minor">
+                  <a:schemeClr val="lt1"/>
+                </a:fontRef>
+              </p:style>
+              <p:txBody>
+                <a:bodyPr rtlCol="0" anchor="ctr"/>
+                <a:lstStyle/>
+                <a:p>
+                  <a:pPr algn="ctr"/>
+                  <a:endParaRPr lang="nl-NL"/>
+                </a:p>
+              </p:txBody>
+            </p:sp>
+            <p:sp>
+              <p:nvSpPr>
+                <p:cNvPr id="49" name="Rectangle 48">
+                  <a:extLst>
+                    <a:ext uri="{FF2B5EF4-FFF2-40B4-BE49-F238E27FC236}">
+                      <a16:creationId xmlns:a16="http://schemas.microsoft.com/office/drawing/2014/main" id="{1E5A492A-F4ED-3BEF-C757-E882B7D6F049}"/>
+                    </a:ext>
+                  </a:extLst>
+                </p:cNvPr>
+                <p:cNvSpPr/>
+                <p:nvPr/>
+              </p:nvSpPr>
+              <p:spPr>
+                <a:xfrm rot="2553114">
+                  <a:off x="3596059" y="3245068"/>
+                  <a:ext cx="1431213" cy="56716"/>
+                </a:xfrm>
+                <a:prstGeom prst="rect">
+                  <a:avLst/>
+                </a:prstGeom>
+              </p:spPr>
+              <p:style>
+                <a:lnRef idx="2">
+                  <a:schemeClr val="accent1">
+                    <a:shade val="50000"/>
+                  </a:schemeClr>
+                </a:lnRef>
+                <a:fillRef idx="1">
+                  <a:schemeClr val="accent1"/>
+                </a:fillRef>
+                <a:effectRef idx="0">
+                  <a:schemeClr val="accent1"/>
+                </a:effectRef>
+                <a:fontRef idx="minor">
+                  <a:schemeClr val="lt1"/>
+                </a:fontRef>
+              </p:style>
+              <p:txBody>
+                <a:bodyPr rtlCol="0" anchor="ctr"/>
+                <a:lstStyle/>
+                <a:p>
+                  <a:pPr algn="ctr"/>
+                  <a:endParaRPr lang="nl-NL"/>
+                </a:p>
+              </p:txBody>
+            </p:sp>
+            <p:sp>
+              <p:nvSpPr>
+                <p:cNvPr id="50" name="Oval 49">
+                  <a:extLst>
+                    <a:ext uri="{FF2B5EF4-FFF2-40B4-BE49-F238E27FC236}">
+                      <a16:creationId xmlns:a16="http://schemas.microsoft.com/office/drawing/2014/main" id="{465AF525-6845-AC51-D41D-6E3F8A35890B}"/>
+                    </a:ext>
+                  </a:extLst>
+                </p:cNvPr>
+                <p:cNvSpPr/>
+                <p:nvPr/>
+              </p:nvSpPr>
+              <p:spPr>
+                <a:xfrm>
+                  <a:off x="3702050" y="2705100"/>
+                  <a:ext cx="127000" cy="127000"/>
+                </a:xfrm>
+                <a:prstGeom prst="ellipse">
+                  <a:avLst/>
+                </a:prstGeom>
+                <a:solidFill>
+                  <a:schemeClr val="accent4"/>
+                </a:solidFill>
+              </p:spPr>
+              <p:style>
+                <a:lnRef idx="2">
+                  <a:schemeClr val="accent1">
+                    <a:shade val="50000"/>
+                  </a:schemeClr>
+                </a:lnRef>
+                <a:fillRef idx="1">
+                  <a:schemeClr val="accent1"/>
+                </a:fillRef>
+                <a:effectRef idx="0">
+                  <a:schemeClr val="accent1"/>
+                </a:effectRef>
+                <a:fontRef idx="minor">
+                  <a:schemeClr val="lt1"/>
+                </a:fontRef>
+              </p:style>
+              <p:txBody>
+                <a:bodyPr rtlCol="0" anchor="ctr"/>
+                <a:lstStyle/>
+                <a:p>
+                  <a:pPr algn="ctr"/>
+                  <a:endParaRPr lang="nl-NL"/>
+                </a:p>
+              </p:txBody>
+            </p:sp>
+            <p:sp>
+              <p:nvSpPr>
+                <p:cNvPr id="51" name="Rectangle 50">
+                  <a:extLst>
+                    <a:ext uri="{FF2B5EF4-FFF2-40B4-BE49-F238E27FC236}">
+                      <a16:creationId xmlns:a16="http://schemas.microsoft.com/office/drawing/2014/main" id="{45C204E6-C1BD-62A6-F8BC-A687CA783633}"/>
+                    </a:ext>
+                  </a:extLst>
+                </p:cNvPr>
+                <p:cNvSpPr/>
+                <p:nvPr/>
+              </p:nvSpPr>
+              <p:spPr>
+                <a:xfrm rot="8162539">
+                  <a:off x="4727677" y="3383609"/>
+                  <a:ext cx="1042107" cy="45719"/>
+                </a:xfrm>
+                <a:prstGeom prst="rect">
+                  <a:avLst/>
+                </a:prstGeom>
+                <a:solidFill>
+                  <a:schemeClr val="accent2"/>
+                </a:solidFill>
+              </p:spPr>
+              <p:style>
+                <a:lnRef idx="2">
+                  <a:schemeClr val="accent1">
+                    <a:shade val="50000"/>
+                  </a:schemeClr>
+                </a:lnRef>
+                <a:fillRef idx="1">
+                  <a:schemeClr val="accent1"/>
+                </a:fillRef>
+                <a:effectRef idx="0">
+                  <a:schemeClr val="accent1"/>
+                </a:effectRef>
+                <a:fontRef idx="minor">
+                  <a:schemeClr val="lt1"/>
+                </a:fontRef>
+              </p:style>
+              <p:txBody>
+                <a:bodyPr rtlCol="0" anchor="ctr"/>
+                <a:lstStyle/>
+                <a:p>
+                  <a:pPr algn="ctr"/>
+                  <a:endParaRPr lang="nl-NL"/>
+                </a:p>
+              </p:txBody>
+            </p:sp>
+            <p:sp>
+              <p:nvSpPr>
+                <p:cNvPr id="52" name="Oval 51">
+                  <a:extLst>
+                    <a:ext uri="{FF2B5EF4-FFF2-40B4-BE49-F238E27FC236}">
+                      <a16:creationId xmlns:a16="http://schemas.microsoft.com/office/drawing/2014/main" id="{7CBEB8F7-B006-D154-AF7C-C9825448DCE0}"/>
+                    </a:ext>
+                  </a:extLst>
+                </p:cNvPr>
+                <p:cNvSpPr/>
+                <p:nvPr/>
+              </p:nvSpPr>
+              <p:spPr>
+                <a:xfrm>
+                  <a:off x="4794281" y="3714751"/>
+                  <a:ext cx="127000" cy="127000"/>
+                </a:xfrm>
+                <a:prstGeom prst="ellipse">
+                  <a:avLst/>
+                </a:prstGeom>
+                <a:solidFill>
+                  <a:schemeClr val="accent4"/>
+                </a:solidFill>
+              </p:spPr>
+              <p:style>
+                <a:lnRef idx="2">
+                  <a:schemeClr val="accent1">
+                    <a:shade val="50000"/>
+                  </a:schemeClr>
+                </a:lnRef>
+                <a:fillRef idx="1">
+                  <a:schemeClr val="accent1"/>
+                </a:fillRef>
+                <a:effectRef idx="0">
+                  <a:schemeClr val="accent1"/>
+                </a:effectRef>
+                <a:fontRef idx="minor">
+                  <a:schemeClr val="lt1"/>
+                </a:fontRef>
+              </p:style>
+              <p:txBody>
+                <a:bodyPr rtlCol="0" anchor="ctr"/>
+                <a:lstStyle/>
+                <a:p>
+                  <a:pPr algn="ctr"/>
+                  <a:endParaRPr lang="nl-NL"/>
+                </a:p>
+              </p:txBody>
+            </p:sp>
+            <p:sp>
+              <p:nvSpPr>
+                <p:cNvPr id="53" name="Oval 52">
+                  <a:extLst>
+                    <a:ext uri="{FF2B5EF4-FFF2-40B4-BE49-F238E27FC236}">
+                      <a16:creationId xmlns:a16="http://schemas.microsoft.com/office/drawing/2014/main" id="{8733764E-CDC3-017F-1A43-BF1495263CBF}"/>
+                    </a:ext>
+                  </a:extLst>
+                </p:cNvPr>
+                <p:cNvSpPr/>
+                <p:nvPr/>
+              </p:nvSpPr>
+              <p:spPr>
+                <a:xfrm>
+                  <a:off x="5577060" y="2964835"/>
+                  <a:ext cx="127000" cy="127000"/>
+                </a:xfrm>
+                <a:prstGeom prst="ellipse">
+                  <a:avLst/>
+                </a:prstGeom>
+                <a:solidFill>
+                  <a:schemeClr val="accent4"/>
+                </a:solidFill>
+              </p:spPr>
+              <p:style>
+                <a:lnRef idx="2">
+                  <a:schemeClr val="accent1">
+                    <a:shade val="50000"/>
+                  </a:schemeClr>
+                </a:lnRef>
+                <a:fillRef idx="1">
+                  <a:schemeClr val="accent1"/>
+                </a:fillRef>
+                <a:effectRef idx="0">
+                  <a:schemeClr val="accent1"/>
+                </a:effectRef>
+                <a:fontRef idx="minor">
+                  <a:schemeClr val="lt1"/>
+                </a:fontRef>
+              </p:style>
+              <p:txBody>
+                <a:bodyPr rtlCol="0" anchor="ctr"/>
+                <a:lstStyle/>
+                <a:p>
+                  <a:pPr algn="ctr"/>
+                  <a:endParaRPr lang="nl-NL"/>
+                </a:p>
+              </p:txBody>
+            </p:sp>
+            <p:cxnSp>
+              <p:nvCxnSpPr>
+                <p:cNvPr id="54" name="Straight Connector 53">
+                  <a:extLst>
+                    <a:ext uri="{FF2B5EF4-FFF2-40B4-BE49-F238E27FC236}">
+                      <a16:creationId xmlns:a16="http://schemas.microsoft.com/office/drawing/2014/main" id="{B45A5274-C8AE-B72F-D17A-5E33816D17EC}"/>
+                    </a:ext>
+                  </a:extLst>
+                </p:cNvPr>
+                <p:cNvCxnSpPr>
+                  <a:cxnSpLocks/>
+                  <a:endCxn id="52" idx="6"/>
+                </p:cNvCxnSpPr>
+                <p:nvPr/>
+              </p:nvCxnSpPr>
+              <p:spPr>
+                <a:xfrm flipH="1">
+                  <a:off x="4921281" y="3766166"/>
+                  <a:ext cx="781899" cy="12085"/>
+                </a:xfrm>
+                <a:prstGeom prst="line">
+                  <a:avLst/>
+                </a:prstGeom>
+                <a:ln>
+                  <a:solidFill>
+                    <a:schemeClr val="tx1"/>
+                  </a:solidFill>
+                </a:ln>
+              </p:spPr>
+              <p:style>
+                <a:lnRef idx="1">
+                  <a:schemeClr val="accent1"/>
+                </a:lnRef>
+                <a:fillRef idx="0">
+                  <a:schemeClr val="accent1"/>
+                </a:fillRef>
+                <a:effectRef idx="0">
+                  <a:schemeClr val="accent1"/>
+                </a:effectRef>
+                <a:fontRef idx="minor">
+                  <a:schemeClr val="tx1"/>
+                </a:fontRef>
+              </p:style>
+            </p:cxnSp>
+            <p:sp>
+              <p:nvSpPr>
+                <p:cNvPr id="55" name="Arc 54">
+                  <a:extLst>
+                    <a:ext uri="{FF2B5EF4-FFF2-40B4-BE49-F238E27FC236}">
+                      <a16:creationId xmlns:a16="http://schemas.microsoft.com/office/drawing/2014/main" id="{A4AFAFD2-A233-D7A6-EF18-CC78A5109D01}"/>
+                    </a:ext>
+                  </a:extLst>
+                </p:cNvPr>
+                <p:cNvSpPr/>
+                <p:nvPr/>
+              </p:nvSpPr>
+              <p:spPr>
+                <a:xfrm rot="330772">
+                  <a:off x="4454600" y="3185941"/>
+                  <a:ext cx="1029298" cy="1057620"/>
+                </a:xfrm>
+                <a:prstGeom prst="arc">
+                  <a:avLst>
+                    <a:gd name="adj1" fmla="val 18598375"/>
+                    <a:gd name="adj2" fmla="val 72582"/>
+                  </a:avLst>
+                </a:prstGeom>
+                <a:noFill/>
+                <a:ln>
+                  <a:solidFill>
+                    <a:schemeClr val="tx1"/>
+                  </a:solidFill>
+                </a:ln>
+              </p:spPr>
+              <p:style>
+                <a:lnRef idx="1">
+                  <a:schemeClr val="accent1"/>
+                </a:lnRef>
+                <a:fillRef idx="0">
+                  <a:schemeClr val="accent1"/>
+                </a:fillRef>
+                <a:effectRef idx="0">
+                  <a:schemeClr val="accent1"/>
+                </a:effectRef>
+                <a:fontRef idx="minor">
+                  <a:schemeClr val="tx1"/>
+                </a:fontRef>
+              </p:style>
+              <p:txBody>
+                <a:bodyPr rtlCol="0" anchor="ctr"/>
+                <a:lstStyle/>
+                <a:p>
+                  <a:pPr algn="ctr"/>
+                  <a:endParaRPr lang="nl-NL"/>
+                </a:p>
+              </p:txBody>
+            </p:sp>
+            <p:cxnSp>
+              <p:nvCxnSpPr>
+                <p:cNvPr id="56" name="Straight Connector 55">
+                  <a:extLst>
+                    <a:ext uri="{FF2B5EF4-FFF2-40B4-BE49-F238E27FC236}">
+                      <a16:creationId xmlns:a16="http://schemas.microsoft.com/office/drawing/2014/main" id="{0945C44E-2479-D7BF-741F-2AC059E418BB}"/>
+                    </a:ext>
+                  </a:extLst>
+                </p:cNvPr>
+                <p:cNvCxnSpPr>
+                  <a:cxnSpLocks/>
+                  <a:endCxn id="50" idx="6"/>
+                </p:cNvCxnSpPr>
+                <p:nvPr/>
+              </p:nvCxnSpPr>
+              <p:spPr>
+                <a:xfrm flipH="1">
+                  <a:off x="3829050" y="2768600"/>
+                  <a:ext cx="1581150" cy="0"/>
+                </a:xfrm>
+                <a:prstGeom prst="line">
+                  <a:avLst/>
+                </a:prstGeom>
+                <a:ln>
+                  <a:solidFill>
+                    <a:schemeClr val="tx1"/>
+                  </a:solidFill>
+                </a:ln>
+              </p:spPr>
+              <p:style>
+                <a:lnRef idx="1">
+                  <a:schemeClr val="accent1"/>
+                </a:lnRef>
+                <a:fillRef idx="0">
+                  <a:schemeClr val="accent1"/>
+                </a:fillRef>
+                <a:effectRef idx="0">
+                  <a:schemeClr val="accent1"/>
+                </a:effectRef>
+                <a:fontRef idx="minor">
+                  <a:schemeClr val="tx1"/>
+                </a:fontRef>
+              </p:style>
+            </p:cxnSp>
+            <p:sp>
+              <p:nvSpPr>
+                <p:cNvPr id="57" name="Arc 56">
+                  <a:extLst>
+                    <a:ext uri="{FF2B5EF4-FFF2-40B4-BE49-F238E27FC236}">
+                      <a16:creationId xmlns:a16="http://schemas.microsoft.com/office/drawing/2014/main" id="{C9C4E377-16E2-7BBA-59EF-BFB49A085C58}"/>
+                    </a:ext>
+                  </a:extLst>
+                </p:cNvPr>
+                <p:cNvSpPr/>
+                <p:nvPr/>
+              </p:nvSpPr>
+              <p:spPr>
+                <a:xfrm rot="2657196">
+                  <a:off x="3377259" y="2277890"/>
+                  <a:ext cx="1029298" cy="1057620"/>
+                </a:xfrm>
+                <a:prstGeom prst="arc">
+                  <a:avLst>
+                    <a:gd name="adj1" fmla="val 18723404"/>
+                    <a:gd name="adj2" fmla="val 72582"/>
+                  </a:avLst>
+                </a:prstGeom>
+                <a:noFill/>
+                <a:ln>
+                  <a:solidFill>
+                    <a:schemeClr val="tx1"/>
+                  </a:solidFill>
+                </a:ln>
+              </p:spPr>
+              <p:style>
+                <a:lnRef idx="1">
+                  <a:schemeClr val="accent1"/>
+                </a:lnRef>
+                <a:fillRef idx="0">
+                  <a:schemeClr val="accent1"/>
+                </a:fillRef>
+                <a:effectRef idx="0">
+                  <a:schemeClr val="accent1"/>
+                </a:effectRef>
+                <a:fontRef idx="minor">
+                  <a:schemeClr val="tx1"/>
+                </a:fontRef>
+              </p:style>
+              <p:txBody>
+                <a:bodyPr rtlCol="0" anchor="ctr"/>
+                <a:lstStyle/>
+                <a:p>
+                  <a:pPr algn="ctr"/>
+                  <a:endParaRPr lang="nl-NL"/>
+                </a:p>
+              </p:txBody>
+            </p:sp>
+            <p:cxnSp>
+              <p:nvCxnSpPr>
+                <p:cNvPr id="59" name="Straight Connector 58">
+                  <a:extLst>
+                    <a:ext uri="{FF2B5EF4-FFF2-40B4-BE49-F238E27FC236}">
+                      <a16:creationId xmlns:a16="http://schemas.microsoft.com/office/drawing/2014/main" id="{B6D9A82B-5BD2-F479-B7A6-F775E4141955}"/>
+                    </a:ext>
+                  </a:extLst>
+                </p:cNvPr>
+                <p:cNvCxnSpPr>
+                  <a:cxnSpLocks/>
+                  <a:stCxn id="53" idx="0"/>
+                </p:cNvCxnSpPr>
+                <p:nvPr/>
+              </p:nvCxnSpPr>
+              <p:spPr>
+                <a:xfrm flipH="1" flipV="1">
+                  <a:off x="5639680" y="2376796"/>
+                  <a:ext cx="880" cy="588039"/>
+                </a:xfrm>
+                <a:prstGeom prst="line">
+                  <a:avLst/>
+                </a:prstGeom>
+                <a:ln>
+                  <a:solidFill>
+                    <a:schemeClr val="tx1"/>
+                  </a:solidFill>
+                </a:ln>
+              </p:spPr>
+              <p:style>
+                <a:lnRef idx="1">
+                  <a:schemeClr val="accent1"/>
+                </a:lnRef>
+                <a:fillRef idx="0">
+                  <a:schemeClr val="accent1"/>
+                </a:fillRef>
+                <a:effectRef idx="0">
+                  <a:schemeClr val="accent1"/>
+                </a:effectRef>
+                <a:fontRef idx="minor">
+                  <a:schemeClr val="tx1"/>
+                </a:fontRef>
+              </p:style>
+            </p:cxnSp>
+            <p:cxnSp>
+              <p:nvCxnSpPr>
+                <p:cNvPr id="60" name="Straight Arrow Connector 59">
+                  <a:extLst>
+                    <a:ext uri="{FF2B5EF4-FFF2-40B4-BE49-F238E27FC236}">
+                      <a16:creationId xmlns:a16="http://schemas.microsoft.com/office/drawing/2014/main" id="{F222BC86-88CE-2DD2-6359-7F498CC43608}"/>
+                    </a:ext>
+                  </a:extLst>
+                </p:cNvPr>
+                <p:cNvCxnSpPr>
+                  <a:cxnSpLocks/>
+                </p:cNvCxnSpPr>
+                <p:nvPr/>
+              </p:nvCxnSpPr>
+              <p:spPr>
+                <a:xfrm flipH="1">
+                  <a:off x="3765325" y="2492991"/>
+                  <a:ext cx="1874355" cy="0"/>
+                </a:xfrm>
+                <a:prstGeom prst="straightConnector1">
+                  <a:avLst/>
+                </a:prstGeom>
+                <a:ln>
+                  <a:solidFill>
+                    <a:schemeClr val="tx1"/>
+                  </a:solidFill>
+                  <a:headEnd type="triangle"/>
+                  <a:tailEnd type="triangle"/>
+                </a:ln>
+              </p:spPr>
+              <p:style>
+                <a:lnRef idx="1">
+                  <a:schemeClr val="accent1"/>
+                </a:lnRef>
+                <a:fillRef idx="0">
+                  <a:schemeClr val="accent1"/>
+                </a:fillRef>
+                <a:effectRef idx="0">
+                  <a:schemeClr val="accent1"/>
+                </a:effectRef>
+                <a:fontRef idx="minor">
+                  <a:schemeClr val="tx1"/>
+                </a:fontRef>
+              </p:style>
+            </p:cxnSp>
+            <p:sp>
+              <p:nvSpPr>
+                <p:cNvPr id="61" name="TextBox 60">
+                  <a:extLst>
+                    <a:ext uri="{FF2B5EF4-FFF2-40B4-BE49-F238E27FC236}">
+                      <a16:creationId xmlns:a16="http://schemas.microsoft.com/office/drawing/2014/main" id="{C9A0E04E-996D-E36F-9FFA-AFE7EAFE9004}"/>
+                    </a:ext>
+                  </a:extLst>
+                </p:cNvPr>
+                <p:cNvSpPr txBox="1"/>
+                <p:nvPr/>
+              </p:nvSpPr>
+              <p:spPr>
+                <a:xfrm>
+                  <a:off x="3995566" y="3321050"/>
+                  <a:ext cx="359394" cy="261610"/>
+                </a:xfrm>
+                <a:prstGeom prst="rect">
+                  <a:avLst/>
+                </a:prstGeom>
+                <a:noFill/>
+              </p:spPr>
+              <p:txBody>
+                <a:bodyPr wrap="none" rtlCol="0">
+                  <a:spAutoFit/>
+                </a:bodyPr>
+                <a:lstStyle/>
+                <a:p>
+                  <a:r>
+                    <a:rPr lang="en-US" sz="1100" dirty="0" err="1"/>
+                    <a:t>s_r</a:t>
+                  </a:r>
+                  <a:endParaRPr lang="nl-NL" sz="1100" dirty="0"/>
+                </a:p>
+              </p:txBody>
+            </p:sp>
+            <p:sp>
+              <p:nvSpPr>
+                <p:cNvPr id="62" name="TextBox 61">
+                  <a:extLst>
+                    <a:ext uri="{FF2B5EF4-FFF2-40B4-BE49-F238E27FC236}">
+                      <a16:creationId xmlns:a16="http://schemas.microsoft.com/office/drawing/2014/main" id="{1D323F95-DA66-41CA-B0DC-8EC330E4E647}"/>
+                    </a:ext>
+                  </a:extLst>
+                </p:cNvPr>
+                <p:cNvSpPr txBox="1"/>
+                <p:nvPr/>
+              </p:nvSpPr>
+              <p:spPr>
+                <a:xfrm>
+                  <a:off x="4903649" y="3167391"/>
+                  <a:ext cx="351378" cy="261610"/>
+                </a:xfrm>
+                <a:prstGeom prst="rect">
+                  <a:avLst/>
+                </a:prstGeom>
+                <a:noFill/>
+              </p:spPr>
+              <p:txBody>
+                <a:bodyPr wrap="none" rtlCol="0">
+                  <a:spAutoFit/>
+                </a:bodyPr>
+                <a:lstStyle/>
+                <a:p>
+                  <a:r>
+                    <a:rPr lang="en-US" sz="1100" dirty="0" err="1"/>
+                    <a:t>t_r</a:t>
+                  </a:r>
+                  <a:endParaRPr lang="nl-NL" sz="1100" dirty="0"/>
+                </a:p>
+              </p:txBody>
+            </p:sp>
+            <p:sp>
+              <p:nvSpPr>
+                <p:cNvPr id="63" name="TextBox 62">
+                  <a:extLst>
+                    <a:ext uri="{FF2B5EF4-FFF2-40B4-BE49-F238E27FC236}">
+                      <a16:creationId xmlns:a16="http://schemas.microsoft.com/office/drawing/2014/main" id="{72E83DDF-084E-98DE-A894-FBEE2FA9B1EB}"/>
+                    </a:ext>
+                  </a:extLst>
+                </p:cNvPr>
+                <p:cNvSpPr txBox="1"/>
+                <p:nvPr/>
+              </p:nvSpPr>
+              <p:spPr>
+                <a:xfrm>
+                  <a:off x="4288297" y="2879210"/>
+                  <a:ext cx="385042" cy="261610"/>
+                </a:xfrm>
+                <a:prstGeom prst="rect">
+                  <a:avLst/>
+                </a:prstGeom>
+                <a:noFill/>
+              </p:spPr>
+              <p:txBody>
+                <a:bodyPr wrap="none" rtlCol="0">
+                  <a:spAutoFit/>
+                </a:bodyPr>
+                <a:lstStyle/>
+                <a:p>
+                  <a:r>
+                    <a:rPr lang="en-US" sz="1100" dirty="0"/>
+                    <a:t>α_r</a:t>
+                  </a:r>
+                  <a:endParaRPr lang="nl-NL" sz="1100" dirty="0"/>
+                </a:p>
+              </p:txBody>
+            </p:sp>
+            <p:sp>
+              <p:nvSpPr>
+                <p:cNvPr id="64" name="TextBox 63">
+                  <a:extLst>
+                    <a:ext uri="{FF2B5EF4-FFF2-40B4-BE49-F238E27FC236}">
+                      <a16:creationId xmlns:a16="http://schemas.microsoft.com/office/drawing/2014/main" id="{80206891-02FC-DD05-B08F-4ABA2E356BE6}"/>
+                    </a:ext>
+                  </a:extLst>
+                </p:cNvPr>
+                <p:cNvSpPr txBox="1"/>
+                <p:nvPr/>
+              </p:nvSpPr>
+              <p:spPr>
+                <a:xfrm>
+                  <a:off x="5394680" y="3392649"/>
+                  <a:ext cx="380232" cy="261610"/>
+                </a:xfrm>
+                <a:prstGeom prst="rect">
+                  <a:avLst/>
+                </a:prstGeom>
+                <a:noFill/>
+              </p:spPr>
+              <p:txBody>
+                <a:bodyPr wrap="none" rtlCol="0">
+                  <a:spAutoFit/>
+                </a:bodyPr>
+                <a:lstStyle/>
+                <a:p>
+                  <a:r>
+                    <a:rPr lang="el-GR" sz="1100" dirty="0"/>
+                    <a:t>β</a:t>
+                  </a:r>
+                  <a:r>
+                    <a:rPr lang="en-US" sz="1100" dirty="0"/>
+                    <a:t>_r</a:t>
+                  </a:r>
+                  <a:endParaRPr lang="nl-NL" sz="1100" dirty="0"/>
+                </a:p>
+              </p:txBody>
+            </p:sp>
+            <p:sp>
+              <p:nvSpPr>
+                <p:cNvPr id="66" name="TextBox 65">
+                  <a:extLst>
+                    <a:ext uri="{FF2B5EF4-FFF2-40B4-BE49-F238E27FC236}">
+                      <a16:creationId xmlns:a16="http://schemas.microsoft.com/office/drawing/2014/main" id="{DA85648C-C627-34B1-88D9-227CAFCF3F95}"/>
+                    </a:ext>
+                  </a:extLst>
+                </p:cNvPr>
+                <p:cNvSpPr txBox="1"/>
+                <p:nvPr/>
+              </p:nvSpPr>
+              <p:spPr>
+                <a:xfrm>
+                  <a:off x="4526813" y="2239109"/>
+                  <a:ext cx="317716" cy="261610"/>
+                </a:xfrm>
+                <a:prstGeom prst="rect">
+                  <a:avLst/>
+                </a:prstGeom>
+                <a:noFill/>
+              </p:spPr>
+              <p:txBody>
+                <a:bodyPr wrap="none" rtlCol="0">
+                  <a:spAutoFit/>
+                </a:bodyPr>
+                <a:lstStyle/>
+                <a:p>
+                  <a:r>
+                    <a:rPr lang="en-US" sz="1100" dirty="0"/>
+                    <a:t>ST</a:t>
+                  </a:r>
+                  <a:endParaRPr lang="nl-NL" sz="1100" dirty="0"/>
+                </a:p>
+              </p:txBody>
+            </p:sp>
+          </p:grpSp>
+        </p:grpSp>
+        <p:sp>
+          <p:nvSpPr>
+            <p:cNvPr id="69" name="TextBox 68">
+              <a:extLst>
+                <a:ext uri="{FF2B5EF4-FFF2-40B4-BE49-F238E27FC236}">
+                  <a16:creationId xmlns:a16="http://schemas.microsoft.com/office/drawing/2014/main" id="{E34E10D9-D9D6-CE9B-B3BC-56DF39BE0B4C}"/>
+                </a:ext>
+              </a:extLst>
+            </p:cNvPr>
+            <p:cNvSpPr txBox="1"/>
+            <p:nvPr/>
+          </p:nvSpPr>
+          <p:spPr>
+            <a:xfrm flipH="1">
+              <a:off x="7861988" y="2554564"/>
+              <a:ext cx="449162" cy="261610"/>
+            </a:xfrm>
+            <a:prstGeom prst="rect">
+              <a:avLst/>
+            </a:prstGeom>
+            <a:noFill/>
+          </p:spPr>
+          <p:txBody>
+            <a:bodyPr wrap="none" rtlCol="0">
+              <a:spAutoFit/>
+            </a:bodyPr>
+            <a:lstStyle/>
+            <a:p>
+              <a:r>
+                <a:rPr lang="en-US" sz="1100" dirty="0"/>
+                <a:t>P1_r</a:t>
+              </a:r>
+              <a:endParaRPr lang="nl-NL" sz="1100" dirty="0"/>
+            </a:p>
+          </p:txBody>
+        </p:sp>
+        <p:sp>
+          <p:nvSpPr>
+            <p:cNvPr id="70" name="TextBox 69">
+              <a:extLst>
+                <a:ext uri="{FF2B5EF4-FFF2-40B4-BE49-F238E27FC236}">
+                  <a16:creationId xmlns:a16="http://schemas.microsoft.com/office/drawing/2014/main" id="{0162F989-14B6-3A77-AB15-86147E0F9D1C}"/>
+                </a:ext>
+              </a:extLst>
+            </p:cNvPr>
+            <p:cNvSpPr txBox="1"/>
+            <p:nvPr/>
+          </p:nvSpPr>
+          <p:spPr>
+            <a:xfrm flipH="1">
+              <a:off x="6495740" y="3582133"/>
+              <a:ext cx="449162" cy="261610"/>
+            </a:xfrm>
+            <a:prstGeom prst="rect">
+              <a:avLst/>
+            </a:prstGeom>
+            <a:noFill/>
+          </p:spPr>
+          <p:txBody>
+            <a:bodyPr wrap="none" rtlCol="0">
+              <a:spAutoFit/>
+            </a:bodyPr>
+            <a:lstStyle/>
+            <a:p>
+              <a:r>
+                <a:rPr lang="en-US" sz="1100" dirty="0"/>
+                <a:t>P2_r</a:t>
+              </a:r>
+              <a:endParaRPr lang="nl-NL" sz="1100" dirty="0"/>
+            </a:p>
+          </p:txBody>
+        </p:sp>
+        <p:grpSp>
+          <p:nvGrpSpPr>
+            <p:cNvPr id="17" name="Group 16">
+              <a:extLst>
+                <a:ext uri="{FF2B5EF4-FFF2-40B4-BE49-F238E27FC236}">
+                  <a16:creationId xmlns:a16="http://schemas.microsoft.com/office/drawing/2014/main" id="{D3CC819D-49A2-6E55-0911-EDAC7C6EFBF3}"/>
+                </a:ext>
+              </a:extLst>
+            </p:cNvPr>
+            <p:cNvGrpSpPr/>
+            <p:nvPr/>
+          </p:nvGrpSpPr>
+          <p:grpSpPr>
+            <a:xfrm>
+              <a:off x="3371889" y="2736163"/>
+              <a:ext cx="679817" cy="769249"/>
+              <a:chOff x="4442886" y="1053553"/>
+              <a:chExt cx="679817" cy="769249"/>
+            </a:xfrm>
+          </p:grpSpPr>
+          <p:grpSp>
+            <p:nvGrpSpPr>
+              <p:cNvPr id="14" name="Group 13">
                 <a:extLst>
                   <a:ext uri="{FF2B5EF4-FFF2-40B4-BE49-F238E27FC236}">
-                    <a16:creationId xmlns:a16="http://schemas.microsoft.com/office/drawing/2014/main" id="{BE9B9054-6889-6208-828D-CA5A449EEBCB}"/>
+                    <a16:creationId xmlns:a16="http://schemas.microsoft.com/office/drawing/2014/main" id="{560BC4C2-CC8A-3483-8CA2-1428B0DA80CF}"/>
                   </a:ext>
                 </a:extLst>
               </p:cNvPr>
-              <p:cNvSpPr/>
+              <p:cNvGrpSpPr/>
               <p:nvPr/>
-            </p:nvSpPr>
-            <p:spPr>
-              <a:xfrm rot="2553114">
-                <a:off x="3596059" y="3245068"/>
-                <a:ext cx="1431213" cy="56716"/>
+            </p:nvGrpSpPr>
+            <p:grpSpPr>
+              <a:xfrm>
+                <a:off x="4442886" y="1169670"/>
+                <a:ext cx="634092" cy="649986"/>
+                <a:chOff x="4442886" y="1169670"/>
+                <a:chExt cx="634092" cy="649986"/>
               </a:xfrm>
-              <a:prstGeom prst="rect">
-                <a:avLst/>
-              </a:prstGeom>
-            </p:spPr>
-            <p:style>
-              <a:lnRef idx="2">
-                <a:schemeClr val="accent1">
-                  <a:shade val="50000"/>
-                </a:schemeClr>
-              </a:lnRef>
-              <a:fillRef idx="1">
-                <a:schemeClr val="accent1"/>
-              </a:fillRef>
-              <a:effectRef idx="0">
-                <a:schemeClr val="accent1"/>
-              </a:effectRef>
-              <a:fontRef idx="minor">
-                <a:schemeClr val="lt1"/>
-              </a:fontRef>
-            </p:style>
-            <p:txBody>
-              <a:bodyPr rtlCol="0" anchor="ctr"/>
-              <a:lstStyle/>
-              <a:p>
-                <a:pPr algn="ctr"/>
-                <a:endParaRPr lang="nl-NL"/>
-              </a:p>
-            </p:txBody>
-          </p:sp>
+            </p:grpSpPr>
+            <p:cxnSp>
+              <p:nvCxnSpPr>
+                <p:cNvPr id="3" name="Straight Arrow Connector 2">
+                  <a:extLst>
+                    <a:ext uri="{FF2B5EF4-FFF2-40B4-BE49-F238E27FC236}">
+                      <a16:creationId xmlns:a16="http://schemas.microsoft.com/office/drawing/2014/main" id="{512DEC71-D95B-E468-1AC4-164960428A85}"/>
+                    </a:ext>
+                  </a:extLst>
+                </p:cNvPr>
+                <p:cNvCxnSpPr>
+                  <a:cxnSpLocks/>
+                </p:cNvCxnSpPr>
+                <p:nvPr/>
+              </p:nvCxnSpPr>
+              <p:spPr>
+                <a:xfrm>
+                  <a:off x="4442886" y="1819656"/>
+                  <a:ext cx="634092" cy="0"/>
+                </a:xfrm>
+                <a:prstGeom prst="straightConnector1">
+                  <a:avLst/>
+                </a:prstGeom>
+                <a:ln w="28575">
+                  <a:solidFill>
+                    <a:schemeClr val="tx1"/>
+                  </a:solidFill>
+                  <a:tailEnd type="triangle"/>
+                </a:ln>
+              </p:spPr>
+              <p:style>
+                <a:lnRef idx="1">
+                  <a:schemeClr val="accent1"/>
+                </a:lnRef>
+                <a:fillRef idx="0">
+                  <a:schemeClr val="accent1"/>
+                </a:fillRef>
+                <a:effectRef idx="0">
+                  <a:schemeClr val="accent1"/>
+                </a:effectRef>
+                <a:fontRef idx="minor">
+                  <a:schemeClr val="tx1"/>
+                </a:fontRef>
+              </p:style>
+            </p:cxnSp>
+            <p:cxnSp>
+              <p:nvCxnSpPr>
+                <p:cNvPr id="71" name="Straight Arrow Connector 70">
+                  <a:extLst>
+                    <a:ext uri="{FF2B5EF4-FFF2-40B4-BE49-F238E27FC236}">
+                      <a16:creationId xmlns:a16="http://schemas.microsoft.com/office/drawing/2014/main" id="{A1C1B863-A8A9-B580-508A-6073916642DC}"/>
+                    </a:ext>
+                  </a:extLst>
+                </p:cNvPr>
+                <p:cNvCxnSpPr>
+                  <a:cxnSpLocks/>
+                </p:cNvCxnSpPr>
+                <p:nvPr/>
+              </p:nvCxnSpPr>
+              <p:spPr>
+                <a:xfrm flipV="1">
+                  <a:off x="4456892" y="1169670"/>
+                  <a:ext cx="0" cy="649986"/>
+                </a:xfrm>
+                <a:prstGeom prst="straightConnector1">
+                  <a:avLst/>
+                </a:prstGeom>
+                <a:ln w="28575">
+                  <a:solidFill>
+                    <a:schemeClr val="tx1"/>
+                  </a:solidFill>
+                  <a:tailEnd type="triangle"/>
+                </a:ln>
+              </p:spPr>
+              <p:style>
+                <a:lnRef idx="1">
+                  <a:schemeClr val="accent1"/>
+                </a:lnRef>
+                <a:fillRef idx="0">
+                  <a:schemeClr val="accent1"/>
+                </a:fillRef>
+                <a:effectRef idx="0">
+                  <a:schemeClr val="accent1"/>
+                </a:effectRef>
+                <a:fontRef idx="minor">
+                  <a:schemeClr val="tx1"/>
+                </a:fontRef>
+              </p:style>
+            </p:cxnSp>
+          </p:grpSp>
           <p:sp>
             <p:nvSpPr>
-              <p:cNvPr id="7" name="Oval 6">
+              <p:cNvPr id="72" name="TextBox 71">
                 <a:extLst>
                   <a:ext uri="{FF2B5EF4-FFF2-40B4-BE49-F238E27FC236}">
-                    <a16:creationId xmlns:a16="http://schemas.microsoft.com/office/drawing/2014/main" id="{1914AE53-37D8-36D4-971B-49BF68532430}"/>
-                  </a:ext>
-                </a:extLst>
-              </p:cNvPr>
-              <p:cNvSpPr/>
-              <p:nvPr/>
-            </p:nvSpPr>
-            <p:spPr>
-              <a:xfrm>
-                <a:off x="3702050" y="2705100"/>
-                <a:ext cx="127000" cy="127000"/>
-              </a:xfrm>
-              <a:prstGeom prst="ellipse">
-                <a:avLst/>
-              </a:prstGeom>
-              <a:solidFill>
-                <a:schemeClr val="accent4"/>
-              </a:solidFill>
-            </p:spPr>
-            <p:style>
-              <a:lnRef idx="2">
-                <a:schemeClr val="accent1">
-                  <a:shade val="50000"/>
-                </a:schemeClr>
-              </a:lnRef>
-              <a:fillRef idx="1">
-                <a:schemeClr val="accent1"/>
-              </a:fillRef>
-              <a:effectRef idx="0">
-                <a:schemeClr val="accent1"/>
-              </a:effectRef>
-              <a:fontRef idx="minor">
-                <a:schemeClr val="lt1"/>
-              </a:fontRef>
-            </p:style>
-            <p:txBody>
-              <a:bodyPr rtlCol="0" anchor="ctr"/>
-              <a:lstStyle/>
-              <a:p>
-                <a:pPr algn="ctr"/>
-                <a:endParaRPr lang="nl-NL"/>
-              </a:p>
-            </p:txBody>
-          </p:sp>
-          <p:sp>
-            <p:nvSpPr>
-              <p:cNvPr id="8" name="Rectangle 7">
-                <a:extLst>
-                  <a:ext uri="{FF2B5EF4-FFF2-40B4-BE49-F238E27FC236}">
-                    <a16:creationId xmlns:a16="http://schemas.microsoft.com/office/drawing/2014/main" id="{F8CA7FF1-ED74-06E3-29E8-62C754C78CBC}"/>
-                  </a:ext>
-                </a:extLst>
-              </p:cNvPr>
-              <p:cNvSpPr/>
-              <p:nvPr/>
-            </p:nvSpPr>
-            <p:spPr>
-              <a:xfrm rot="8162539">
-                <a:off x="4727677" y="3383609"/>
-                <a:ext cx="1042107" cy="45719"/>
-              </a:xfrm>
-              <a:prstGeom prst="rect">
-                <a:avLst/>
-              </a:prstGeom>
-              <a:solidFill>
-                <a:schemeClr val="accent2"/>
-              </a:solidFill>
-            </p:spPr>
-            <p:style>
-              <a:lnRef idx="2">
-                <a:schemeClr val="accent1">
-                  <a:shade val="50000"/>
-                </a:schemeClr>
-              </a:lnRef>
-              <a:fillRef idx="1">
-                <a:schemeClr val="accent1"/>
-              </a:fillRef>
-              <a:effectRef idx="0">
-                <a:schemeClr val="accent1"/>
-              </a:effectRef>
-              <a:fontRef idx="minor">
-                <a:schemeClr val="lt1"/>
-              </a:fontRef>
-            </p:style>
-            <p:txBody>
-              <a:bodyPr rtlCol="0" anchor="ctr"/>
-              <a:lstStyle/>
-              <a:p>
-                <a:pPr algn="ctr"/>
-                <a:endParaRPr lang="nl-NL"/>
-              </a:p>
-            </p:txBody>
-          </p:sp>
-          <p:sp>
-            <p:nvSpPr>
-              <p:cNvPr id="9" name="Oval 8">
-                <a:extLst>
-                  <a:ext uri="{FF2B5EF4-FFF2-40B4-BE49-F238E27FC236}">
-                    <a16:creationId xmlns:a16="http://schemas.microsoft.com/office/drawing/2014/main" id="{14C017B8-5C6C-267E-B4A3-0CB14928E4BE}"/>
-                  </a:ext>
-                </a:extLst>
-              </p:cNvPr>
-              <p:cNvSpPr/>
-              <p:nvPr/>
-            </p:nvSpPr>
-            <p:spPr>
-              <a:xfrm>
-                <a:off x="4794281" y="3714751"/>
-                <a:ext cx="127000" cy="127000"/>
-              </a:xfrm>
-              <a:prstGeom prst="ellipse">
-                <a:avLst/>
-              </a:prstGeom>
-              <a:solidFill>
-                <a:schemeClr val="accent4"/>
-              </a:solidFill>
-            </p:spPr>
-            <p:style>
-              <a:lnRef idx="2">
-                <a:schemeClr val="accent1">
-                  <a:shade val="50000"/>
-                </a:schemeClr>
-              </a:lnRef>
-              <a:fillRef idx="1">
-                <a:schemeClr val="accent1"/>
-              </a:fillRef>
-              <a:effectRef idx="0">
-                <a:schemeClr val="accent1"/>
-              </a:effectRef>
-              <a:fontRef idx="minor">
-                <a:schemeClr val="lt1"/>
-              </a:fontRef>
-            </p:style>
-            <p:txBody>
-              <a:bodyPr rtlCol="0" anchor="ctr"/>
-              <a:lstStyle/>
-              <a:p>
-                <a:pPr algn="ctr"/>
-                <a:endParaRPr lang="nl-NL"/>
-              </a:p>
-            </p:txBody>
-          </p:sp>
-          <p:sp>
-            <p:nvSpPr>
-              <p:cNvPr id="10" name="Oval 9">
-                <a:extLst>
-                  <a:ext uri="{FF2B5EF4-FFF2-40B4-BE49-F238E27FC236}">
-                    <a16:creationId xmlns:a16="http://schemas.microsoft.com/office/drawing/2014/main" id="{84035177-8B4C-9265-7B26-3294FBCE9204}"/>
-                  </a:ext>
-                </a:extLst>
-              </p:cNvPr>
-              <p:cNvSpPr/>
-              <p:nvPr/>
-            </p:nvSpPr>
-            <p:spPr>
-              <a:xfrm>
-                <a:off x="5577060" y="2964835"/>
-                <a:ext cx="127000" cy="127000"/>
-              </a:xfrm>
-              <a:prstGeom prst="ellipse">
-                <a:avLst/>
-              </a:prstGeom>
-              <a:solidFill>
-                <a:schemeClr val="accent4"/>
-              </a:solidFill>
-            </p:spPr>
-            <p:style>
-              <a:lnRef idx="2">
-                <a:schemeClr val="accent1">
-                  <a:shade val="50000"/>
-                </a:schemeClr>
-              </a:lnRef>
-              <a:fillRef idx="1">
-                <a:schemeClr val="accent1"/>
-              </a:fillRef>
-              <a:effectRef idx="0">
-                <a:schemeClr val="accent1"/>
-              </a:effectRef>
-              <a:fontRef idx="minor">
-                <a:schemeClr val="lt1"/>
-              </a:fontRef>
-            </p:style>
-            <p:txBody>
-              <a:bodyPr rtlCol="0" anchor="ctr"/>
-              <a:lstStyle/>
-              <a:p>
-                <a:pPr algn="ctr"/>
-                <a:endParaRPr lang="nl-NL"/>
-              </a:p>
-            </p:txBody>
-          </p:sp>
-          <p:cxnSp>
-            <p:nvCxnSpPr>
-              <p:cNvPr id="11" name="Straight Connector 10">
-                <a:extLst>
-                  <a:ext uri="{FF2B5EF4-FFF2-40B4-BE49-F238E27FC236}">
-                    <a16:creationId xmlns:a16="http://schemas.microsoft.com/office/drawing/2014/main" id="{F92E8DDA-000A-A618-17BB-B58BD44A7C95}"/>
-                  </a:ext>
-                </a:extLst>
-              </p:cNvPr>
-              <p:cNvCxnSpPr>
-                <a:cxnSpLocks/>
-                <a:endCxn id="9" idx="6"/>
-              </p:cNvCxnSpPr>
-              <p:nvPr/>
-            </p:nvCxnSpPr>
-            <p:spPr>
-              <a:xfrm flipH="1">
-                <a:off x="4921281" y="3766166"/>
-                <a:ext cx="781899" cy="12085"/>
-              </a:xfrm>
-              <a:prstGeom prst="line">
-                <a:avLst/>
-              </a:prstGeom>
-              <a:ln>
-                <a:solidFill>
-                  <a:schemeClr val="tx1"/>
-                </a:solidFill>
-              </a:ln>
-            </p:spPr>
-            <p:style>
-              <a:lnRef idx="1">
-                <a:schemeClr val="accent1"/>
-              </a:lnRef>
-              <a:fillRef idx="0">
-                <a:schemeClr val="accent1"/>
-              </a:fillRef>
-              <a:effectRef idx="0">
-                <a:schemeClr val="accent1"/>
-              </a:effectRef>
-              <a:fontRef idx="minor">
-                <a:schemeClr val="tx1"/>
-              </a:fontRef>
-            </p:style>
-          </p:cxnSp>
-          <p:sp>
-            <p:nvSpPr>
-              <p:cNvPr id="12" name="Arc 11">
-                <a:extLst>
-                  <a:ext uri="{FF2B5EF4-FFF2-40B4-BE49-F238E27FC236}">
-                    <a16:creationId xmlns:a16="http://schemas.microsoft.com/office/drawing/2014/main" id="{735845CD-7056-B650-5C3F-3C28B5F4FDA0}"/>
-                  </a:ext>
-                </a:extLst>
-              </p:cNvPr>
-              <p:cNvSpPr/>
-              <p:nvPr/>
-            </p:nvSpPr>
-            <p:spPr>
-              <a:xfrm rot="330772">
-                <a:off x="4454600" y="3185941"/>
-                <a:ext cx="1029298" cy="1057620"/>
-              </a:xfrm>
-              <a:prstGeom prst="arc">
-                <a:avLst>
-                  <a:gd name="adj1" fmla="val 18598375"/>
-                  <a:gd name="adj2" fmla="val 72582"/>
-                </a:avLst>
-              </a:prstGeom>
-              <a:noFill/>
-              <a:ln>
-                <a:solidFill>
-                  <a:schemeClr val="tx1"/>
-                </a:solidFill>
-              </a:ln>
-            </p:spPr>
-            <p:style>
-              <a:lnRef idx="1">
-                <a:schemeClr val="accent1"/>
-              </a:lnRef>
-              <a:fillRef idx="0">
-                <a:schemeClr val="accent1"/>
-              </a:fillRef>
-              <a:effectRef idx="0">
-                <a:schemeClr val="accent1"/>
-              </a:effectRef>
-              <a:fontRef idx="minor">
-                <a:schemeClr val="tx1"/>
-              </a:fontRef>
-            </p:style>
-            <p:txBody>
-              <a:bodyPr rtlCol="0" anchor="ctr"/>
-              <a:lstStyle/>
-              <a:p>
-                <a:pPr algn="ctr"/>
-                <a:endParaRPr lang="nl-NL"/>
-              </a:p>
-            </p:txBody>
-          </p:sp>
-          <p:cxnSp>
-            <p:nvCxnSpPr>
-              <p:cNvPr id="15" name="Straight Connector 14">
-                <a:extLst>
-                  <a:ext uri="{FF2B5EF4-FFF2-40B4-BE49-F238E27FC236}">
-                    <a16:creationId xmlns:a16="http://schemas.microsoft.com/office/drawing/2014/main" id="{B80B9A7A-66A6-199A-81B6-255CCC0D91A8}"/>
-                  </a:ext>
-                </a:extLst>
-              </p:cNvPr>
-              <p:cNvCxnSpPr>
-                <a:cxnSpLocks/>
-                <a:endCxn id="7" idx="6"/>
-              </p:cNvCxnSpPr>
-              <p:nvPr/>
-            </p:nvCxnSpPr>
-            <p:spPr>
-              <a:xfrm flipH="1">
-                <a:off x="3829050" y="2768600"/>
-                <a:ext cx="1581150" cy="0"/>
-              </a:xfrm>
-              <a:prstGeom prst="line">
-                <a:avLst/>
-              </a:prstGeom>
-              <a:ln>
-                <a:solidFill>
-                  <a:schemeClr val="tx1"/>
-                </a:solidFill>
-              </a:ln>
-            </p:spPr>
-            <p:style>
-              <a:lnRef idx="1">
-                <a:schemeClr val="accent1"/>
-              </a:lnRef>
-              <a:fillRef idx="0">
-                <a:schemeClr val="accent1"/>
-              </a:fillRef>
-              <a:effectRef idx="0">
-                <a:schemeClr val="accent1"/>
-              </a:effectRef>
-              <a:fontRef idx="minor">
-                <a:schemeClr val="tx1"/>
-              </a:fontRef>
-            </p:style>
-          </p:cxnSp>
-          <p:sp>
-            <p:nvSpPr>
-              <p:cNvPr id="16" name="Arc 15">
-                <a:extLst>
-                  <a:ext uri="{FF2B5EF4-FFF2-40B4-BE49-F238E27FC236}">
-                    <a16:creationId xmlns:a16="http://schemas.microsoft.com/office/drawing/2014/main" id="{0FC2920A-4686-F6D5-8C39-8182579BF6A6}"/>
-                  </a:ext>
-                </a:extLst>
-              </p:cNvPr>
-              <p:cNvSpPr/>
-              <p:nvPr/>
-            </p:nvSpPr>
-            <p:spPr>
-              <a:xfrm rot="2657196">
-                <a:off x="3377259" y="2277890"/>
-                <a:ext cx="1029298" cy="1057620"/>
-              </a:xfrm>
-              <a:prstGeom prst="arc">
-                <a:avLst>
-                  <a:gd name="adj1" fmla="val 18723404"/>
-                  <a:gd name="adj2" fmla="val 72582"/>
-                </a:avLst>
-              </a:prstGeom>
-              <a:noFill/>
-              <a:ln>
-                <a:solidFill>
-                  <a:schemeClr val="tx1"/>
-                </a:solidFill>
-              </a:ln>
-            </p:spPr>
-            <p:style>
-              <a:lnRef idx="1">
-                <a:schemeClr val="accent1"/>
-              </a:lnRef>
-              <a:fillRef idx="0">
-                <a:schemeClr val="accent1"/>
-              </a:fillRef>
-              <a:effectRef idx="0">
-                <a:schemeClr val="accent1"/>
-              </a:effectRef>
-              <a:fontRef idx="minor">
-                <a:schemeClr val="tx1"/>
-              </a:fontRef>
-            </p:style>
-            <p:txBody>
-              <a:bodyPr rtlCol="0" anchor="ctr"/>
-              <a:lstStyle/>
-              <a:p>
-                <a:pPr algn="ctr"/>
-                <a:endParaRPr lang="nl-NL"/>
-              </a:p>
-            </p:txBody>
-          </p:sp>
-          <p:cxnSp>
-            <p:nvCxnSpPr>
-              <p:cNvPr id="25" name="Straight Arrow Connector 24">
-                <a:extLst>
-                  <a:ext uri="{FF2B5EF4-FFF2-40B4-BE49-F238E27FC236}">
-                    <a16:creationId xmlns:a16="http://schemas.microsoft.com/office/drawing/2014/main" id="{50AB6BDA-8422-C160-44B1-AEF9ABBBC2B1}"/>
-                  </a:ext>
-                </a:extLst>
-              </p:cNvPr>
-              <p:cNvCxnSpPr>
-                <a:cxnSpLocks/>
-              </p:cNvCxnSpPr>
-              <p:nvPr/>
-            </p:nvCxnSpPr>
-            <p:spPr>
-              <a:xfrm>
-                <a:off x="5289550" y="2768600"/>
-                <a:ext cx="0" cy="266085"/>
-              </a:xfrm>
-              <a:prstGeom prst="straightConnector1">
-                <a:avLst/>
-              </a:prstGeom>
-              <a:ln>
-                <a:solidFill>
-                  <a:schemeClr val="tx1"/>
-                </a:solidFill>
-                <a:headEnd type="triangle"/>
-                <a:tailEnd type="triangle"/>
-              </a:ln>
-            </p:spPr>
-            <p:style>
-              <a:lnRef idx="1">
-                <a:schemeClr val="accent1"/>
-              </a:lnRef>
-              <a:fillRef idx="0">
-                <a:schemeClr val="accent1"/>
-              </a:fillRef>
-              <a:effectRef idx="0">
-                <a:schemeClr val="accent1"/>
-              </a:effectRef>
-              <a:fontRef idx="minor">
-                <a:schemeClr val="tx1"/>
-              </a:fontRef>
-            </p:style>
-          </p:cxnSp>
-          <p:cxnSp>
-            <p:nvCxnSpPr>
-              <p:cNvPr id="30" name="Straight Connector 29">
-                <a:extLst>
-                  <a:ext uri="{FF2B5EF4-FFF2-40B4-BE49-F238E27FC236}">
-                    <a16:creationId xmlns:a16="http://schemas.microsoft.com/office/drawing/2014/main" id="{B8A034A7-FF88-5563-4250-0DEE2CBAEFB9}"/>
-                  </a:ext>
-                </a:extLst>
-              </p:cNvPr>
-              <p:cNvCxnSpPr>
-                <a:cxnSpLocks/>
-                <a:stCxn id="10" idx="0"/>
-              </p:cNvCxnSpPr>
-              <p:nvPr/>
-            </p:nvCxnSpPr>
-            <p:spPr>
-              <a:xfrm flipH="1" flipV="1">
-                <a:off x="5639680" y="2376796"/>
-                <a:ext cx="880" cy="588039"/>
-              </a:xfrm>
-              <a:prstGeom prst="line">
-                <a:avLst/>
-              </a:prstGeom>
-              <a:ln>
-                <a:solidFill>
-                  <a:schemeClr val="tx1"/>
-                </a:solidFill>
-              </a:ln>
-            </p:spPr>
-            <p:style>
-              <a:lnRef idx="1">
-                <a:schemeClr val="accent1"/>
-              </a:lnRef>
-              <a:fillRef idx="0">
-                <a:schemeClr val="accent1"/>
-              </a:fillRef>
-              <a:effectRef idx="0">
-                <a:schemeClr val="accent1"/>
-              </a:effectRef>
-              <a:fontRef idx="minor">
-                <a:schemeClr val="tx1"/>
-              </a:fontRef>
-            </p:style>
-          </p:cxnSp>
-          <p:cxnSp>
-            <p:nvCxnSpPr>
-              <p:cNvPr id="35" name="Straight Arrow Connector 34">
-                <a:extLst>
-                  <a:ext uri="{FF2B5EF4-FFF2-40B4-BE49-F238E27FC236}">
-                    <a16:creationId xmlns:a16="http://schemas.microsoft.com/office/drawing/2014/main" id="{FB7E2EE0-2DED-100C-2700-30828F31A1CA}"/>
-                  </a:ext>
-                </a:extLst>
-              </p:cNvPr>
-              <p:cNvCxnSpPr>
-                <a:cxnSpLocks/>
-              </p:cNvCxnSpPr>
-              <p:nvPr/>
-            </p:nvCxnSpPr>
-            <p:spPr>
-              <a:xfrm flipH="1">
-                <a:off x="3765325" y="2492991"/>
-                <a:ext cx="1874355" cy="0"/>
-              </a:xfrm>
-              <a:prstGeom prst="straightConnector1">
-                <a:avLst/>
-              </a:prstGeom>
-              <a:ln>
-                <a:solidFill>
-                  <a:schemeClr val="tx1"/>
-                </a:solidFill>
-                <a:headEnd type="triangle"/>
-                <a:tailEnd type="triangle"/>
-              </a:ln>
-            </p:spPr>
-            <p:style>
-              <a:lnRef idx="1">
-                <a:schemeClr val="accent1"/>
-              </a:lnRef>
-              <a:fillRef idx="0">
-                <a:schemeClr val="accent1"/>
-              </a:fillRef>
-              <a:effectRef idx="0">
-                <a:schemeClr val="accent1"/>
-              </a:effectRef>
-              <a:fontRef idx="minor">
-                <a:schemeClr val="tx1"/>
-              </a:fontRef>
-            </p:style>
-          </p:cxnSp>
-          <p:sp>
-            <p:nvSpPr>
-              <p:cNvPr id="39" name="TextBox 38">
-                <a:extLst>
-                  <a:ext uri="{FF2B5EF4-FFF2-40B4-BE49-F238E27FC236}">
-                    <a16:creationId xmlns:a16="http://schemas.microsoft.com/office/drawing/2014/main" id="{539B31BE-E992-6FD7-CA60-397E9F08E2D0}"/>
+                    <a16:creationId xmlns:a16="http://schemas.microsoft.com/office/drawing/2014/main" id="{29D58BBC-AF14-D646-7332-DF5D825FE3AA}"/>
                   </a:ext>
                 </a:extLst>
               </p:cNvPr>
@@ -5876,9 +6946,9 @@
               <p:nvPr/>
             </p:nvSpPr>
             <p:spPr>
-              <a:xfrm>
-                <a:off x="4013200" y="3321050"/>
-                <a:ext cx="341760" cy="261610"/>
+              <a:xfrm flipH="1">
+                <a:off x="4861093" y="1561192"/>
+                <a:ext cx="261610" cy="261610"/>
               </a:xfrm>
               <a:prstGeom prst="rect">
                 <a:avLst/>
@@ -5892,19 +6962,19 @@
               <a:lstStyle/>
               <a:p>
                 <a:r>
-                  <a:rPr lang="en-US" sz="1100" dirty="0" err="1"/>
-                  <a:t>s_l</a:t>
+                  <a:rPr lang="en-US" sz="1100" b="1" dirty="0"/>
+                  <a:t>X</a:t>
                 </a:r>
-                <a:endParaRPr lang="nl-NL" sz="1100" dirty="0"/>
+                <a:endParaRPr lang="nl-NL" sz="1100" b="1" dirty="0"/>
               </a:p>
             </p:txBody>
           </p:sp>
           <p:sp>
             <p:nvSpPr>
-              <p:cNvPr id="40" name="TextBox 39">
+              <p:cNvPr id="73" name="TextBox 72">
                 <a:extLst>
                   <a:ext uri="{FF2B5EF4-FFF2-40B4-BE49-F238E27FC236}">
-                    <a16:creationId xmlns:a16="http://schemas.microsoft.com/office/drawing/2014/main" id="{EB78CACE-E3DE-42AE-03C6-A234855E8D2C}"/>
+                    <a16:creationId xmlns:a16="http://schemas.microsoft.com/office/drawing/2014/main" id="{784C38E8-A28C-43DC-05DF-E4730D2DA869}"/>
                   </a:ext>
                 </a:extLst>
               </p:cNvPr>
@@ -5912,9 +6982,9 @@
               <p:nvPr/>
             </p:nvSpPr>
             <p:spPr>
-              <a:xfrm>
-                <a:off x="4921281" y="3167391"/>
-                <a:ext cx="333746" cy="261610"/>
+              <a:xfrm flipH="1">
+                <a:off x="4452410" y="1053553"/>
+                <a:ext cx="258404" cy="261610"/>
               </a:xfrm>
               <a:prstGeom prst="rect">
                 <a:avLst/>
@@ -5928,19 +6998,148 @@
               <a:lstStyle/>
               <a:p>
                 <a:r>
-                  <a:rPr lang="en-US" sz="1100" dirty="0" err="1"/>
-                  <a:t>t_l</a:t>
+                  <a:rPr lang="en-US" sz="1100" b="1" dirty="0"/>
+                  <a:t>Y</a:t>
                 </a:r>
-                <a:endParaRPr lang="nl-NL" sz="1100" dirty="0"/>
               </a:p>
             </p:txBody>
           </p:sp>
+        </p:grpSp>
+        <p:grpSp>
+          <p:nvGrpSpPr>
+            <p:cNvPr id="74" name="Group 73">
+              <a:extLst>
+                <a:ext uri="{FF2B5EF4-FFF2-40B4-BE49-F238E27FC236}">
+                  <a16:creationId xmlns:a16="http://schemas.microsoft.com/office/drawing/2014/main" id="{575EFD38-2B78-E1C9-7599-A39FE80C347B}"/>
+                </a:ext>
+              </a:extLst>
+            </p:cNvPr>
+            <p:cNvGrpSpPr/>
+            <p:nvPr/>
+          </p:nvGrpSpPr>
+          <p:grpSpPr>
+            <a:xfrm flipH="1">
+              <a:off x="7277005" y="1785315"/>
+              <a:ext cx="679817" cy="769249"/>
+              <a:chOff x="4442886" y="1053553"/>
+              <a:chExt cx="679817" cy="769249"/>
+            </a:xfrm>
+          </p:grpSpPr>
+          <p:grpSp>
+            <p:nvGrpSpPr>
+              <p:cNvPr id="75" name="Group 74">
+                <a:extLst>
+                  <a:ext uri="{FF2B5EF4-FFF2-40B4-BE49-F238E27FC236}">
+                    <a16:creationId xmlns:a16="http://schemas.microsoft.com/office/drawing/2014/main" id="{948ADB44-451E-1887-F4E3-F6B4A2ACACBC}"/>
+                  </a:ext>
+                </a:extLst>
+              </p:cNvPr>
+              <p:cNvGrpSpPr/>
+              <p:nvPr/>
+            </p:nvGrpSpPr>
+            <p:grpSpPr>
+              <a:xfrm>
+                <a:off x="4442886" y="1169670"/>
+                <a:ext cx="634092" cy="649986"/>
+                <a:chOff x="4442886" y="1169670"/>
+                <a:chExt cx="634092" cy="649986"/>
+              </a:xfrm>
+            </p:grpSpPr>
+            <p:cxnSp>
+              <p:nvCxnSpPr>
+                <p:cNvPr id="78" name="Straight Arrow Connector 77">
+                  <a:extLst>
+                    <a:ext uri="{FF2B5EF4-FFF2-40B4-BE49-F238E27FC236}">
+                      <a16:creationId xmlns:a16="http://schemas.microsoft.com/office/drawing/2014/main" id="{365F951E-03FA-412F-D5CA-E30BFA297665}"/>
+                    </a:ext>
+                  </a:extLst>
+                </p:cNvPr>
+                <p:cNvCxnSpPr>
+                  <a:cxnSpLocks/>
+                </p:cNvCxnSpPr>
+                <p:nvPr/>
+              </p:nvCxnSpPr>
+              <p:spPr>
+                <a:xfrm>
+                  <a:off x="4442886" y="1819656"/>
+                  <a:ext cx="634092" cy="0"/>
+                </a:xfrm>
+                <a:prstGeom prst="straightConnector1">
+                  <a:avLst/>
+                </a:prstGeom>
+                <a:ln w="28575">
+                  <a:solidFill>
+                    <a:schemeClr val="tx1"/>
+                  </a:solidFill>
+                  <a:tailEnd type="triangle"/>
+                </a:ln>
+              </p:spPr>
+              <p:style>
+                <a:lnRef idx="1">
+                  <a:schemeClr val="accent1"/>
+                </a:lnRef>
+                <a:fillRef idx="0">
+                  <a:schemeClr val="accent1"/>
+                </a:fillRef>
+                <a:effectRef idx="0">
+                  <a:schemeClr val="accent1"/>
+                </a:effectRef>
+                <a:fontRef idx="minor">
+                  <a:schemeClr val="tx1"/>
+                </a:fontRef>
+              </p:style>
+            </p:cxnSp>
+            <p:cxnSp>
+              <p:nvCxnSpPr>
+                <p:cNvPr id="79" name="Straight Arrow Connector 78">
+                  <a:extLst>
+                    <a:ext uri="{FF2B5EF4-FFF2-40B4-BE49-F238E27FC236}">
+                      <a16:creationId xmlns:a16="http://schemas.microsoft.com/office/drawing/2014/main" id="{1F29D38A-2EE8-68F9-EE8F-E784D975E47A}"/>
+                    </a:ext>
+                  </a:extLst>
+                </p:cNvPr>
+                <p:cNvCxnSpPr>
+                  <a:cxnSpLocks/>
+                </p:cNvCxnSpPr>
+                <p:nvPr/>
+              </p:nvCxnSpPr>
+              <p:spPr>
+                <a:xfrm flipV="1">
+                  <a:off x="4456892" y="1169670"/>
+                  <a:ext cx="0" cy="649986"/>
+                </a:xfrm>
+                <a:prstGeom prst="straightConnector1">
+                  <a:avLst/>
+                </a:prstGeom>
+                <a:ln w="28575">
+                  <a:solidFill>
+                    <a:schemeClr val="tx1"/>
+                  </a:solidFill>
+                  <a:tailEnd type="triangle"/>
+                </a:ln>
+              </p:spPr>
+              <p:style>
+                <a:lnRef idx="1">
+                  <a:schemeClr val="accent1"/>
+                </a:lnRef>
+                <a:fillRef idx="0">
+                  <a:schemeClr val="accent1"/>
+                </a:fillRef>
+                <a:effectRef idx="0">
+                  <a:schemeClr val="accent1"/>
+                </a:effectRef>
+                <a:fontRef idx="minor">
+                  <a:schemeClr val="tx1"/>
+                </a:fontRef>
+              </p:style>
+            </p:cxnSp>
+          </p:grpSp>
           <p:sp>
             <p:nvSpPr>
-              <p:cNvPr id="41" name="TextBox 40">
+              <p:cNvPr id="76" name="TextBox 75">
                 <a:extLst>
                   <a:ext uri="{FF2B5EF4-FFF2-40B4-BE49-F238E27FC236}">
-                    <a16:creationId xmlns:a16="http://schemas.microsoft.com/office/drawing/2014/main" id="{D5CE6D56-55F6-5AA9-1FAF-6389F55FE75B}"/>
+                    <a16:creationId xmlns:a16="http://schemas.microsoft.com/office/drawing/2014/main" id="{0EEEE578-D91E-CD75-4298-B1F36F165D0E}"/>
                   </a:ext>
                 </a:extLst>
               </p:cNvPr>
@@ -5948,9 +7147,9 @@
               <p:nvPr/>
             </p:nvSpPr>
             <p:spPr>
-              <a:xfrm>
-                <a:off x="4305931" y="2879210"/>
-                <a:ext cx="367408" cy="261610"/>
+              <a:xfrm flipH="1">
+                <a:off x="4861093" y="1561192"/>
+                <a:ext cx="261610" cy="261610"/>
               </a:xfrm>
               <a:prstGeom prst="rect">
                 <a:avLst/>
@@ -5964,19 +7163,19 @@
               <a:lstStyle/>
               <a:p>
                 <a:r>
-                  <a:rPr lang="en-US" sz="1100" dirty="0"/>
-                  <a:t>α_l</a:t>
+                  <a:rPr lang="en-US" sz="1100" b="1" dirty="0"/>
+                  <a:t>X</a:t>
                 </a:r>
-                <a:endParaRPr lang="nl-NL" sz="1100" dirty="0"/>
+                <a:endParaRPr lang="nl-NL" sz="1100" b="1" dirty="0"/>
               </a:p>
             </p:txBody>
           </p:sp>
           <p:sp>
             <p:nvSpPr>
-              <p:cNvPr id="42" name="TextBox 41">
+              <p:cNvPr id="77" name="TextBox 76">
                 <a:extLst>
                   <a:ext uri="{FF2B5EF4-FFF2-40B4-BE49-F238E27FC236}">
-                    <a16:creationId xmlns:a16="http://schemas.microsoft.com/office/drawing/2014/main" id="{D2E25F9E-DA26-9A9A-E3BC-7DB12AEC21C0}"/>
+                    <a16:creationId xmlns:a16="http://schemas.microsoft.com/office/drawing/2014/main" id="{BEA9A049-4C95-05E9-88CF-0C1983404F9D}"/>
                   </a:ext>
                 </a:extLst>
               </p:cNvPr>
@@ -5984,9 +7183,9 @@
               <p:nvPr/>
             </p:nvSpPr>
             <p:spPr>
-              <a:xfrm>
-                <a:off x="5412312" y="3392649"/>
-                <a:ext cx="362600" cy="261610"/>
+              <a:xfrm flipH="1">
+                <a:off x="4452410" y="1053553"/>
+                <a:ext cx="258404" cy="261610"/>
               </a:xfrm>
               <a:prstGeom prst="rect">
                 <a:avLst/>
@@ -6000,1002 +7199,156 @@
               <a:lstStyle/>
               <a:p>
                 <a:r>
-                  <a:rPr lang="el-GR" sz="1100" dirty="0"/>
-                  <a:t>β</a:t>
+                  <a:rPr lang="en-US" sz="1100" b="1" dirty="0"/>
+                  <a:t>Y</a:t>
                 </a:r>
-                <a:r>
-                  <a:rPr lang="en-US" sz="1100" dirty="0"/>
-                  <a:t>_l</a:t>
-                </a:r>
-                <a:endParaRPr lang="nl-NL" sz="1100" dirty="0"/>
-              </a:p>
-            </p:txBody>
-          </p:sp>
-          <p:sp>
-            <p:nvSpPr>
-              <p:cNvPr id="43" name="TextBox 42">
-                <a:extLst>
-                  <a:ext uri="{FF2B5EF4-FFF2-40B4-BE49-F238E27FC236}">
-                    <a16:creationId xmlns:a16="http://schemas.microsoft.com/office/drawing/2014/main" id="{1619B6BC-E24A-182F-9D1E-63E3DF2F4903}"/>
-                  </a:ext>
-                </a:extLst>
-              </p:cNvPr>
-              <p:cNvSpPr txBox="1"/>
-              <p:nvPr/>
-            </p:nvSpPr>
-            <p:spPr>
-              <a:xfrm>
-                <a:off x="4914294" y="2773692"/>
-                <a:ext cx="351378" cy="261610"/>
-              </a:xfrm>
-              <a:prstGeom prst="rect">
-                <a:avLst/>
-              </a:prstGeom>
-              <a:noFill/>
-            </p:spPr>
-            <p:txBody>
-              <a:bodyPr wrap="none" rtlCol="0">
-                <a:spAutoFit/>
-              </a:bodyPr>
-              <a:lstStyle/>
-              <a:p>
-                <a:r>
-                  <a:rPr lang="en-US" sz="1100" dirty="0" err="1"/>
-                  <a:t>y_l</a:t>
-                </a:r>
-                <a:endParaRPr lang="nl-NL" sz="1100" dirty="0"/>
-              </a:p>
-            </p:txBody>
-          </p:sp>
-          <p:sp>
-            <p:nvSpPr>
-              <p:cNvPr id="44" name="TextBox 43">
-                <a:extLst>
-                  <a:ext uri="{FF2B5EF4-FFF2-40B4-BE49-F238E27FC236}">
-                    <a16:creationId xmlns:a16="http://schemas.microsoft.com/office/drawing/2014/main" id="{512C28A6-4434-0925-9E61-9DC15ACE650F}"/>
-                  </a:ext>
-                </a:extLst>
-              </p:cNvPr>
-              <p:cNvSpPr txBox="1"/>
-              <p:nvPr/>
-            </p:nvSpPr>
-            <p:spPr>
-              <a:xfrm>
-                <a:off x="4526813" y="2239109"/>
-                <a:ext cx="317716" cy="261610"/>
-              </a:xfrm>
-              <a:prstGeom prst="rect">
-                <a:avLst/>
-              </a:prstGeom>
-              <a:noFill/>
-            </p:spPr>
-            <p:txBody>
-              <a:bodyPr wrap="none" rtlCol="0">
-                <a:spAutoFit/>
-              </a:bodyPr>
-              <a:lstStyle/>
-              <a:p>
-                <a:r>
-                  <a:rPr lang="en-US" sz="1100" dirty="0"/>
-                  <a:t>ST</a:t>
-                </a:r>
-                <a:endParaRPr lang="nl-NL" sz="1100" dirty="0"/>
               </a:p>
             </p:txBody>
           </p:sp>
         </p:grpSp>
-        <p:grpSp>
-          <p:nvGrpSpPr>
-            <p:cNvPr id="46" name="Group 45">
+        <p:sp>
+          <p:nvSpPr>
+            <p:cNvPr id="80" name="TextBox 79">
               <a:extLst>
                 <a:ext uri="{FF2B5EF4-FFF2-40B4-BE49-F238E27FC236}">
-                  <a16:creationId xmlns:a16="http://schemas.microsoft.com/office/drawing/2014/main" id="{66D85E1D-B809-AC98-8A25-DD3D6F2B00C8}"/>
+                  <a16:creationId xmlns:a16="http://schemas.microsoft.com/office/drawing/2014/main" id="{DB521701-EC41-F9BD-B4FB-AEDFB59B600B}"/>
                 </a:ext>
               </a:extLst>
             </p:cNvPr>
-            <p:cNvGrpSpPr/>
+            <p:cNvSpPr txBox="1"/>
             <p:nvPr/>
-          </p:nvGrpSpPr>
-          <p:grpSpPr>
+          </p:nvSpPr>
+          <p:spPr>
             <a:xfrm flipH="1">
-              <a:off x="5939834" y="922614"/>
-              <a:ext cx="2485612" cy="3263900"/>
-              <a:chOff x="3289300" y="1136650"/>
-              <a:chExt cx="2485612" cy="3263900"/>
+              <a:off x="5596890" y="2558940"/>
+              <a:ext cx="449162" cy="261610"/>
             </a:xfrm>
-          </p:grpSpPr>
-          <p:cxnSp>
-            <p:nvCxnSpPr>
-              <p:cNvPr id="47" name="Straight Connector 46">
-                <a:extLst>
-                  <a:ext uri="{FF2B5EF4-FFF2-40B4-BE49-F238E27FC236}">
-                    <a16:creationId xmlns:a16="http://schemas.microsoft.com/office/drawing/2014/main" id="{9C9B4E55-AF0B-1BF3-223F-4C18B815D86A}"/>
-                  </a:ext>
-                </a:extLst>
-              </p:cNvPr>
-              <p:cNvCxnSpPr>
-                <a:cxnSpLocks/>
-              </p:cNvCxnSpPr>
-              <p:nvPr/>
-            </p:nvCxnSpPr>
-            <p:spPr>
-              <a:xfrm flipH="1" flipV="1">
-                <a:off x="5226050" y="3028335"/>
-                <a:ext cx="477130" cy="3482"/>
-              </a:xfrm>
-              <a:prstGeom prst="line">
-                <a:avLst/>
-              </a:prstGeom>
-              <a:ln>
-                <a:solidFill>
-                  <a:schemeClr val="tx1"/>
-                </a:solidFill>
-              </a:ln>
-            </p:spPr>
-            <p:style>
-              <a:lnRef idx="1">
-                <a:schemeClr val="accent1"/>
-              </a:lnRef>
-              <a:fillRef idx="0">
-                <a:schemeClr val="accent1"/>
-              </a:fillRef>
-              <a:effectRef idx="0">
-                <a:schemeClr val="accent1"/>
-              </a:effectRef>
-              <a:fontRef idx="minor">
-                <a:schemeClr val="tx1"/>
-              </a:fontRef>
-            </p:style>
-          </p:cxnSp>
-          <p:sp>
-            <p:nvSpPr>
-              <p:cNvPr id="48" name="Rectangle 47">
-                <a:extLst>
-                  <a:ext uri="{FF2B5EF4-FFF2-40B4-BE49-F238E27FC236}">
-                    <a16:creationId xmlns:a16="http://schemas.microsoft.com/office/drawing/2014/main" id="{7D334D42-B0D5-9FEA-054E-AEB366B00383}"/>
-                  </a:ext>
-                </a:extLst>
-              </p:cNvPr>
-              <p:cNvSpPr/>
-              <p:nvPr/>
-            </p:nvSpPr>
-            <p:spPr>
-              <a:xfrm>
-                <a:off x="3289300" y="1136650"/>
-                <a:ext cx="476250" cy="3263900"/>
-              </a:xfrm>
-              <a:prstGeom prst="rect">
-                <a:avLst/>
-              </a:prstGeom>
-              <a:solidFill>
-                <a:schemeClr val="accent3">
-                  <a:lumMod val="75000"/>
-                </a:schemeClr>
-              </a:solidFill>
-              <a:ln>
-                <a:solidFill>
-                  <a:schemeClr val="accent3">
-                    <a:lumMod val="75000"/>
-                  </a:schemeClr>
-                </a:solidFill>
-              </a:ln>
-            </p:spPr>
-            <p:style>
-              <a:lnRef idx="2">
-                <a:schemeClr val="accent1">
-                  <a:shade val="50000"/>
-                </a:schemeClr>
-              </a:lnRef>
-              <a:fillRef idx="1">
-                <a:schemeClr val="accent1"/>
-              </a:fillRef>
-              <a:effectRef idx="0">
-                <a:schemeClr val="accent1"/>
-              </a:effectRef>
-              <a:fontRef idx="minor">
-                <a:schemeClr val="lt1"/>
-              </a:fontRef>
-            </p:style>
-            <p:txBody>
-              <a:bodyPr rtlCol="0" anchor="ctr"/>
-              <a:lstStyle/>
-              <a:p>
-                <a:pPr algn="ctr"/>
-                <a:endParaRPr lang="nl-NL"/>
-              </a:p>
-            </p:txBody>
-          </p:sp>
-          <p:sp>
-            <p:nvSpPr>
-              <p:cNvPr id="49" name="Rectangle 48">
-                <a:extLst>
-                  <a:ext uri="{FF2B5EF4-FFF2-40B4-BE49-F238E27FC236}">
-                    <a16:creationId xmlns:a16="http://schemas.microsoft.com/office/drawing/2014/main" id="{1E5A492A-F4ED-3BEF-C757-E882B7D6F049}"/>
-                  </a:ext>
-                </a:extLst>
-              </p:cNvPr>
-              <p:cNvSpPr/>
-              <p:nvPr/>
-            </p:nvSpPr>
-            <p:spPr>
-              <a:xfrm rot="2553114">
-                <a:off x="3596059" y="3245068"/>
-                <a:ext cx="1431213" cy="56716"/>
-              </a:xfrm>
-              <a:prstGeom prst="rect">
-                <a:avLst/>
-              </a:prstGeom>
-            </p:spPr>
-            <p:style>
-              <a:lnRef idx="2">
-                <a:schemeClr val="accent1">
-                  <a:shade val="50000"/>
-                </a:schemeClr>
-              </a:lnRef>
-              <a:fillRef idx="1">
-                <a:schemeClr val="accent1"/>
-              </a:fillRef>
-              <a:effectRef idx="0">
-                <a:schemeClr val="accent1"/>
-              </a:effectRef>
-              <a:fontRef idx="minor">
-                <a:schemeClr val="lt1"/>
-              </a:fontRef>
-            </p:style>
-            <p:txBody>
-              <a:bodyPr rtlCol="0" anchor="ctr"/>
-              <a:lstStyle/>
-              <a:p>
-                <a:pPr algn="ctr"/>
-                <a:endParaRPr lang="nl-NL"/>
-              </a:p>
-            </p:txBody>
-          </p:sp>
-          <p:sp>
-            <p:nvSpPr>
-              <p:cNvPr id="50" name="Oval 49">
-                <a:extLst>
-                  <a:ext uri="{FF2B5EF4-FFF2-40B4-BE49-F238E27FC236}">
-                    <a16:creationId xmlns:a16="http://schemas.microsoft.com/office/drawing/2014/main" id="{465AF525-6845-AC51-D41D-6E3F8A35890B}"/>
-                  </a:ext>
-                </a:extLst>
-              </p:cNvPr>
-              <p:cNvSpPr/>
-              <p:nvPr/>
-            </p:nvSpPr>
-            <p:spPr>
-              <a:xfrm>
-                <a:off x="3702050" y="2705100"/>
-                <a:ext cx="127000" cy="127000"/>
-              </a:xfrm>
-              <a:prstGeom prst="ellipse">
-                <a:avLst/>
-              </a:prstGeom>
-              <a:solidFill>
-                <a:schemeClr val="accent4"/>
-              </a:solidFill>
-            </p:spPr>
-            <p:style>
-              <a:lnRef idx="2">
-                <a:schemeClr val="accent1">
-                  <a:shade val="50000"/>
-                </a:schemeClr>
-              </a:lnRef>
-              <a:fillRef idx="1">
-                <a:schemeClr val="accent1"/>
-              </a:fillRef>
-              <a:effectRef idx="0">
-                <a:schemeClr val="accent1"/>
-              </a:effectRef>
-              <a:fontRef idx="minor">
-                <a:schemeClr val="lt1"/>
-              </a:fontRef>
-            </p:style>
-            <p:txBody>
-              <a:bodyPr rtlCol="0" anchor="ctr"/>
-              <a:lstStyle/>
-              <a:p>
-                <a:pPr algn="ctr"/>
-                <a:endParaRPr lang="nl-NL"/>
-              </a:p>
-            </p:txBody>
-          </p:sp>
-          <p:sp>
-            <p:nvSpPr>
-              <p:cNvPr id="51" name="Rectangle 50">
-                <a:extLst>
-                  <a:ext uri="{FF2B5EF4-FFF2-40B4-BE49-F238E27FC236}">
-                    <a16:creationId xmlns:a16="http://schemas.microsoft.com/office/drawing/2014/main" id="{45C204E6-C1BD-62A6-F8BC-A687CA783633}"/>
-                  </a:ext>
-                </a:extLst>
-              </p:cNvPr>
-              <p:cNvSpPr/>
-              <p:nvPr/>
-            </p:nvSpPr>
-            <p:spPr>
-              <a:xfrm rot="8162539">
-                <a:off x="4727677" y="3383609"/>
-                <a:ext cx="1042107" cy="45719"/>
-              </a:xfrm>
-              <a:prstGeom prst="rect">
-                <a:avLst/>
-              </a:prstGeom>
-              <a:solidFill>
-                <a:schemeClr val="accent2"/>
-              </a:solidFill>
-            </p:spPr>
-            <p:style>
-              <a:lnRef idx="2">
-                <a:schemeClr val="accent1">
-                  <a:shade val="50000"/>
-                </a:schemeClr>
-              </a:lnRef>
-              <a:fillRef idx="1">
-                <a:schemeClr val="accent1"/>
-              </a:fillRef>
-              <a:effectRef idx="0">
-                <a:schemeClr val="accent1"/>
-              </a:effectRef>
-              <a:fontRef idx="minor">
-                <a:schemeClr val="lt1"/>
-              </a:fontRef>
-            </p:style>
-            <p:txBody>
-              <a:bodyPr rtlCol="0" anchor="ctr"/>
-              <a:lstStyle/>
-              <a:p>
-                <a:pPr algn="ctr"/>
-                <a:endParaRPr lang="nl-NL"/>
-              </a:p>
-            </p:txBody>
-          </p:sp>
-          <p:sp>
-            <p:nvSpPr>
-              <p:cNvPr id="52" name="Oval 51">
-                <a:extLst>
-                  <a:ext uri="{FF2B5EF4-FFF2-40B4-BE49-F238E27FC236}">
-                    <a16:creationId xmlns:a16="http://schemas.microsoft.com/office/drawing/2014/main" id="{7CBEB8F7-B006-D154-AF7C-C9825448DCE0}"/>
-                  </a:ext>
-                </a:extLst>
-              </p:cNvPr>
-              <p:cNvSpPr/>
-              <p:nvPr/>
-            </p:nvSpPr>
-            <p:spPr>
-              <a:xfrm>
-                <a:off x="4794281" y="3714751"/>
-                <a:ext cx="127000" cy="127000"/>
-              </a:xfrm>
-              <a:prstGeom prst="ellipse">
-                <a:avLst/>
-              </a:prstGeom>
-              <a:solidFill>
-                <a:schemeClr val="accent4"/>
-              </a:solidFill>
-            </p:spPr>
-            <p:style>
-              <a:lnRef idx="2">
-                <a:schemeClr val="accent1">
-                  <a:shade val="50000"/>
-                </a:schemeClr>
-              </a:lnRef>
-              <a:fillRef idx="1">
-                <a:schemeClr val="accent1"/>
-              </a:fillRef>
-              <a:effectRef idx="0">
-                <a:schemeClr val="accent1"/>
-              </a:effectRef>
-              <a:fontRef idx="minor">
-                <a:schemeClr val="lt1"/>
-              </a:fontRef>
-            </p:style>
-            <p:txBody>
-              <a:bodyPr rtlCol="0" anchor="ctr"/>
-              <a:lstStyle/>
-              <a:p>
-                <a:pPr algn="ctr"/>
-                <a:endParaRPr lang="nl-NL"/>
-              </a:p>
-            </p:txBody>
-          </p:sp>
-          <p:sp>
-            <p:nvSpPr>
-              <p:cNvPr id="53" name="Oval 52">
-                <a:extLst>
-                  <a:ext uri="{FF2B5EF4-FFF2-40B4-BE49-F238E27FC236}">
-                    <a16:creationId xmlns:a16="http://schemas.microsoft.com/office/drawing/2014/main" id="{8733764E-CDC3-017F-1A43-BF1495263CBF}"/>
-                  </a:ext>
-                </a:extLst>
-              </p:cNvPr>
-              <p:cNvSpPr/>
-              <p:nvPr/>
-            </p:nvSpPr>
-            <p:spPr>
-              <a:xfrm>
-                <a:off x="5577060" y="2964835"/>
-                <a:ext cx="127000" cy="127000"/>
-              </a:xfrm>
-              <a:prstGeom prst="ellipse">
-                <a:avLst/>
-              </a:prstGeom>
-              <a:solidFill>
-                <a:schemeClr val="accent4"/>
-              </a:solidFill>
-            </p:spPr>
-            <p:style>
-              <a:lnRef idx="2">
-                <a:schemeClr val="accent1">
-                  <a:shade val="50000"/>
-                </a:schemeClr>
-              </a:lnRef>
-              <a:fillRef idx="1">
-                <a:schemeClr val="accent1"/>
-              </a:fillRef>
-              <a:effectRef idx="0">
-                <a:schemeClr val="accent1"/>
-              </a:effectRef>
-              <a:fontRef idx="minor">
-                <a:schemeClr val="lt1"/>
-              </a:fontRef>
-            </p:style>
-            <p:txBody>
-              <a:bodyPr rtlCol="0" anchor="ctr"/>
-              <a:lstStyle/>
-              <a:p>
-                <a:pPr algn="ctr"/>
-                <a:endParaRPr lang="nl-NL"/>
-              </a:p>
-            </p:txBody>
-          </p:sp>
-          <p:cxnSp>
-            <p:nvCxnSpPr>
-              <p:cNvPr id="54" name="Straight Connector 53">
-                <a:extLst>
-                  <a:ext uri="{FF2B5EF4-FFF2-40B4-BE49-F238E27FC236}">
-                    <a16:creationId xmlns:a16="http://schemas.microsoft.com/office/drawing/2014/main" id="{B45A5274-C8AE-B72F-D17A-5E33816D17EC}"/>
-                  </a:ext>
-                </a:extLst>
-              </p:cNvPr>
-              <p:cNvCxnSpPr>
-                <a:cxnSpLocks/>
-                <a:endCxn id="52" idx="6"/>
-              </p:cNvCxnSpPr>
-              <p:nvPr/>
-            </p:nvCxnSpPr>
-            <p:spPr>
-              <a:xfrm flipH="1">
-                <a:off x="4921281" y="3766166"/>
-                <a:ext cx="781899" cy="12085"/>
-              </a:xfrm>
-              <a:prstGeom prst="line">
-                <a:avLst/>
-              </a:prstGeom>
-              <a:ln>
-                <a:solidFill>
-                  <a:schemeClr val="tx1"/>
-                </a:solidFill>
-              </a:ln>
-            </p:spPr>
-            <p:style>
-              <a:lnRef idx="1">
-                <a:schemeClr val="accent1"/>
-              </a:lnRef>
-              <a:fillRef idx="0">
-                <a:schemeClr val="accent1"/>
-              </a:fillRef>
-              <a:effectRef idx="0">
-                <a:schemeClr val="accent1"/>
-              </a:effectRef>
-              <a:fontRef idx="minor">
-                <a:schemeClr val="tx1"/>
-              </a:fontRef>
-            </p:style>
-          </p:cxnSp>
-          <p:sp>
-            <p:nvSpPr>
-              <p:cNvPr id="55" name="Arc 54">
-                <a:extLst>
-                  <a:ext uri="{FF2B5EF4-FFF2-40B4-BE49-F238E27FC236}">
-                    <a16:creationId xmlns:a16="http://schemas.microsoft.com/office/drawing/2014/main" id="{A4AFAFD2-A233-D7A6-EF18-CC78A5109D01}"/>
-                  </a:ext>
-                </a:extLst>
-              </p:cNvPr>
-              <p:cNvSpPr/>
-              <p:nvPr/>
-            </p:nvSpPr>
-            <p:spPr>
-              <a:xfrm rot="330772">
-                <a:off x="4454600" y="3185941"/>
-                <a:ext cx="1029298" cy="1057620"/>
-              </a:xfrm>
-              <a:prstGeom prst="arc">
-                <a:avLst>
-                  <a:gd name="adj1" fmla="val 18598375"/>
-                  <a:gd name="adj2" fmla="val 72582"/>
-                </a:avLst>
-              </a:prstGeom>
-              <a:noFill/>
-              <a:ln>
-                <a:solidFill>
-                  <a:schemeClr val="tx1"/>
-                </a:solidFill>
-              </a:ln>
-            </p:spPr>
-            <p:style>
-              <a:lnRef idx="1">
-                <a:schemeClr val="accent1"/>
-              </a:lnRef>
-              <a:fillRef idx="0">
-                <a:schemeClr val="accent1"/>
-              </a:fillRef>
-              <a:effectRef idx="0">
-                <a:schemeClr val="accent1"/>
-              </a:effectRef>
-              <a:fontRef idx="minor">
-                <a:schemeClr val="tx1"/>
-              </a:fontRef>
-            </p:style>
-            <p:txBody>
-              <a:bodyPr rtlCol="0" anchor="ctr"/>
-              <a:lstStyle/>
-              <a:p>
-                <a:pPr algn="ctr"/>
-                <a:endParaRPr lang="nl-NL"/>
-              </a:p>
-            </p:txBody>
-          </p:sp>
-          <p:cxnSp>
-            <p:nvCxnSpPr>
-              <p:cNvPr id="56" name="Straight Connector 55">
-                <a:extLst>
-                  <a:ext uri="{FF2B5EF4-FFF2-40B4-BE49-F238E27FC236}">
-                    <a16:creationId xmlns:a16="http://schemas.microsoft.com/office/drawing/2014/main" id="{0945C44E-2479-D7BF-741F-2AC059E418BB}"/>
-                  </a:ext>
-                </a:extLst>
-              </p:cNvPr>
-              <p:cNvCxnSpPr>
-                <a:cxnSpLocks/>
-                <a:endCxn id="50" idx="6"/>
-              </p:cNvCxnSpPr>
-              <p:nvPr/>
-            </p:nvCxnSpPr>
-            <p:spPr>
-              <a:xfrm flipH="1">
-                <a:off x="3829050" y="2768600"/>
-                <a:ext cx="1581150" cy="0"/>
-              </a:xfrm>
-              <a:prstGeom prst="line">
-                <a:avLst/>
-              </a:prstGeom>
-              <a:ln>
-                <a:solidFill>
-                  <a:schemeClr val="tx1"/>
-                </a:solidFill>
-              </a:ln>
-            </p:spPr>
-            <p:style>
-              <a:lnRef idx="1">
-                <a:schemeClr val="accent1"/>
-              </a:lnRef>
-              <a:fillRef idx="0">
-                <a:schemeClr val="accent1"/>
-              </a:fillRef>
-              <a:effectRef idx="0">
-                <a:schemeClr val="accent1"/>
-              </a:effectRef>
-              <a:fontRef idx="minor">
-                <a:schemeClr val="tx1"/>
-              </a:fontRef>
-            </p:style>
-          </p:cxnSp>
-          <p:sp>
-            <p:nvSpPr>
-              <p:cNvPr id="57" name="Arc 56">
-                <a:extLst>
-                  <a:ext uri="{FF2B5EF4-FFF2-40B4-BE49-F238E27FC236}">
-                    <a16:creationId xmlns:a16="http://schemas.microsoft.com/office/drawing/2014/main" id="{C9C4E377-16E2-7BBA-59EF-BFB49A085C58}"/>
-                  </a:ext>
-                </a:extLst>
-              </p:cNvPr>
-              <p:cNvSpPr/>
-              <p:nvPr/>
-            </p:nvSpPr>
-            <p:spPr>
-              <a:xfrm rot="2657196">
-                <a:off x="3377259" y="2277890"/>
-                <a:ext cx="1029298" cy="1057620"/>
-              </a:xfrm>
-              <a:prstGeom prst="arc">
-                <a:avLst>
-                  <a:gd name="adj1" fmla="val 18723404"/>
-                  <a:gd name="adj2" fmla="val 72582"/>
-                </a:avLst>
-              </a:prstGeom>
-              <a:noFill/>
-              <a:ln>
-                <a:solidFill>
-                  <a:schemeClr val="tx1"/>
-                </a:solidFill>
-              </a:ln>
-            </p:spPr>
-            <p:style>
-              <a:lnRef idx="1">
-                <a:schemeClr val="accent1"/>
-              </a:lnRef>
-              <a:fillRef idx="0">
-                <a:schemeClr val="accent1"/>
-              </a:fillRef>
-              <a:effectRef idx="0">
-                <a:schemeClr val="accent1"/>
-              </a:effectRef>
-              <a:fontRef idx="minor">
-                <a:schemeClr val="tx1"/>
-              </a:fontRef>
-            </p:style>
-            <p:txBody>
-              <a:bodyPr rtlCol="0" anchor="ctr"/>
-              <a:lstStyle/>
-              <a:p>
-                <a:pPr algn="ctr"/>
-                <a:endParaRPr lang="nl-NL"/>
-              </a:p>
-            </p:txBody>
-          </p:sp>
-          <p:cxnSp>
-            <p:nvCxnSpPr>
-              <p:cNvPr id="58" name="Straight Arrow Connector 57">
-                <a:extLst>
-                  <a:ext uri="{FF2B5EF4-FFF2-40B4-BE49-F238E27FC236}">
-                    <a16:creationId xmlns:a16="http://schemas.microsoft.com/office/drawing/2014/main" id="{3B976F32-C814-CFAA-1216-86D6A978FD3C}"/>
-                  </a:ext>
-                </a:extLst>
-              </p:cNvPr>
-              <p:cNvCxnSpPr>
-                <a:cxnSpLocks/>
-              </p:cNvCxnSpPr>
-              <p:nvPr/>
-            </p:nvCxnSpPr>
-            <p:spPr>
-              <a:xfrm>
-                <a:off x="5289550" y="2768600"/>
-                <a:ext cx="0" cy="266085"/>
-              </a:xfrm>
-              <a:prstGeom prst="straightConnector1">
-                <a:avLst/>
-              </a:prstGeom>
-              <a:ln>
-                <a:solidFill>
-                  <a:schemeClr val="tx1"/>
-                </a:solidFill>
-                <a:headEnd type="triangle"/>
-                <a:tailEnd type="triangle"/>
-              </a:ln>
-            </p:spPr>
-            <p:style>
-              <a:lnRef idx="1">
-                <a:schemeClr val="accent1"/>
-              </a:lnRef>
-              <a:fillRef idx="0">
-                <a:schemeClr val="accent1"/>
-              </a:fillRef>
-              <a:effectRef idx="0">
-                <a:schemeClr val="accent1"/>
-              </a:effectRef>
-              <a:fontRef idx="minor">
-                <a:schemeClr val="tx1"/>
-              </a:fontRef>
-            </p:style>
-          </p:cxnSp>
-          <p:cxnSp>
-            <p:nvCxnSpPr>
-              <p:cNvPr id="59" name="Straight Connector 58">
-                <a:extLst>
-                  <a:ext uri="{FF2B5EF4-FFF2-40B4-BE49-F238E27FC236}">
-                    <a16:creationId xmlns:a16="http://schemas.microsoft.com/office/drawing/2014/main" id="{B6D9A82B-5BD2-F479-B7A6-F775E4141955}"/>
-                  </a:ext>
-                </a:extLst>
-              </p:cNvPr>
-              <p:cNvCxnSpPr>
-                <a:cxnSpLocks/>
-                <a:stCxn id="53" idx="0"/>
-              </p:cNvCxnSpPr>
-              <p:nvPr/>
-            </p:nvCxnSpPr>
-            <p:spPr>
-              <a:xfrm flipH="1" flipV="1">
-                <a:off x="5639680" y="2376796"/>
-                <a:ext cx="880" cy="588039"/>
-              </a:xfrm>
-              <a:prstGeom prst="line">
-                <a:avLst/>
-              </a:prstGeom>
-              <a:ln>
-                <a:solidFill>
-                  <a:schemeClr val="tx1"/>
-                </a:solidFill>
-              </a:ln>
-            </p:spPr>
-            <p:style>
-              <a:lnRef idx="1">
-                <a:schemeClr val="accent1"/>
-              </a:lnRef>
-              <a:fillRef idx="0">
-                <a:schemeClr val="accent1"/>
-              </a:fillRef>
-              <a:effectRef idx="0">
-                <a:schemeClr val="accent1"/>
-              </a:effectRef>
-              <a:fontRef idx="minor">
-                <a:schemeClr val="tx1"/>
-              </a:fontRef>
-            </p:style>
-          </p:cxnSp>
-          <p:cxnSp>
-            <p:nvCxnSpPr>
-              <p:cNvPr id="60" name="Straight Arrow Connector 59">
-                <a:extLst>
-                  <a:ext uri="{FF2B5EF4-FFF2-40B4-BE49-F238E27FC236}">
-                    <a16:creationId xmlns:a16="http://schemas.microsoft.com/office/drawing/2014/main" id="{F222BC86-88CE-2DD2-6359-7F498CC43608}"/>
-                  </a:ext>
-                </a:extLst>
-              </p:cNvPr>
-              <p:cNvCxnSpPr>
-                <a:cxnSpLocks/>
-              </p:cNvCxnSpPr>
-              <p:nvPr/>
-            </p:nvCxnSpPr>
-            <p:spPr>
-              <a:xfrm flipH="1">
-                <a:off x="3765325" y="2492991"/>
-                <a:ext cx="1874355" cy="0"/>
-              </a:xfrm>
-              <a:prstGeom prst="straightConnector1">
-                <a:avLst/>
-              </a:prstGeom>
-              <a:ln>
-                <a:solidFill>
-                  <a:schemeClr val="tx1"/>
-                </a:solidFill>
-                <a:headEnd type="triangle"/>
-                <a:tailEnd type="triangle"/>
-              </a:ln>
-            </p:spPr>
-            <p:style>
-              <a:lnRef idx="1">
-                <a:schemeClr val="accent1"/>
-              </a:lnRef>
-              <a:fillRef idx="0">
-                <a:schemeClr val="accent1"/>
-              </a:fillRef>
-              <a:effectRef idx="0">
-                <a:schemeClr val="accent1"/>
-              </a:effectRef>
-              <a:fontRef idx="minor">
-                <a:schemeClr val="tx1"/>
-              </a:fontRef>
-            </p:style>
-          </p:cxnSp>
-          <p:sp>
-            <p:nvSpPr>
-              <p:cNvPr id="61" name="TextBox 60">
-                <a:extLst>
-                  <a:ext uri="{FF2B5EF4-FFF2-40B4-BE49-F238E27FC236}">
-                    <a16:creationId xmlns:a16="http://schemas.microsoft.com/office/drawing/2014/main" id="{C9A0E04E-996D-E36F-9FFA-AFE7EAFE9004}"/>
-                  </a:ext>
-                </a:extLst>
-              </p:cNvPr>
-              <p:cNvSpPr txBox="1"/>
-              <p:nvPr/>
-            </p:nvSpPr>
-            <p:spPr>
-              <a:xfrm>
-                <a:off x="3995566" y="3321050"/>
-                <a:ext cx="359394" cy="261610"/>
-              </a:xfrm>
-              <a:prstGeom prst="rect">
-                <a:avLst/>
-              </a:prstGeom>
-              <a:noFill/>
-            </p:spPr>
-            <p:txBody>
-              <a:bodyPr wrap="none" rtlCol="0">
-                <a:spAutoFit/>
-              </a:bodyPr>
-              <a:lstStyle/>
-              <a:p>
-                <a:r>
-                  <a:rPr lang="en-US" sz="1100" dirty="0" err="1"/>
-                  <a:t>s_r</a:t>
-                </a:r>
-                <a:endParaRPr lang="nl-NL" sz="1100" dirty="0"/>
-              </a:p>
-            </p:txBody>
-          </p:sp>
-          <p:sp>
-            <p:nvSpPr>
-              <p:cNvPr id="62" name="TextBox 61">
-                <a:extLst>
-                  <a:ext uri="{FF2B5EF4-FFF2-40B4-BE49-F238E27FC236}">
-                    <a16:creationId xmlns:a16="http://schemas.microsoft.com/office/drawing/2014/main" id="{1D323F95-DA66-41CA-B0DC-8EC330E4E647}"/>
-                  </a:ext>
-                </a:extLst>
-              </p:cNvPr>
-              <p:cNvSpPr txBox="1"/>
-              <p:nvPr/>
-            </p:nvSpPr>
-            <p:spPr>
-              <a:xfrm>
-                <a:off x="4903649" y="3167391"/>
-                <a:ext cx="351378" cy="261610"/>
-              </a:xfrm>
-              <a:prstGeom prst="rect">
-                <a:avLst/>
-              </a:prstGeom>
-              <a:noFill/>
-            </p:spPr>
-            <p:txBody>
-              <a:bodyPr wrap="none" rtlCol="0">
-                <a:spAutoFit/>
-              </a:bodyPr>
-              <a:lstStyle/>
-              <a:p>
-                <a:r>
-                  <a:rPr lang="en-US" sz="1100" dirty="0" err="1"/>
-                  <a:t>t_r</a:t>
-                </a:r>
-                <a:endParaRPr lang="nl-NL" sz="1100" dirty="0"/>
-              </a:p>
-            </p:txBody>
-          </p:sp>
-          <p:sp>
-            <p:nvSpPr>
-              <p:cNvPr id="63" name="TextBox 62">
-                <a:extLst>
-                  <a:ext uri="{FF2B5EF4-FFF2-40B4-BE49-F238E27FC236}">
-                    <a16:creationId xmlns:a16="http://schemas.microsoft.com/office/drawing/2014/main" id="{72E83DDF-084E-98DE-A894-FBEE2FA9B1EB}"/>
-                  </a:ext>
-                </a:extLst>
-              </p:cNvPr>
-              <p:cNvSpPr txBox="1"/>
-              <p:nvPr/>
-            </p:nvSpPr>
-            <p:spPr>
-              <a:xfrm>
-                <a:off x="4288297" y="2879210"/>
-                <a:ext cx="385042" cy="261610"/>
-              </a:xfrm>
-              <a:prstGeom prst="rect">
-                <a:avLst/>
-              </a:prstGeom>
-              <a:noFill/>
-            </p:spPr>
-            <p:txBody>
-              <a:bodyPr wrap="none" rtlCol="0">
-                <a:spAutoFit/>
-              </a:bodyPr>
-              <a:lstStyle/>
-              <a:p>
-                <a:r>
-                  <a:rPr lang="en-US" sz="1100" dirty="0"/>
-                  <a:t>α_r</a:t>
-                </a:r>
-                <a:endParaRPr lang="nl-NL" sz="1100" dirty="0"/>
-              </a:p>
-            </p:txBody>
-          </p:sp>
-          <p:sp>
-            <p:nvSpPr>
-              <p:cNvPr id="64" name="TextBox 63">
-                <a:extLst>
-                  <a:ext uri="{FF2B5EF4-FFF2-40B4-BE49-F238E27FC236}">
-                    <a16:creationId xmlns:a16="http://schemas.microsoft.com/office/drawing/2014/main" id="{80206891-02FC-DD05-B08F-4ABA2E356BE6}"/>
-                  </a:ext>
-                </a:extLst>
-              </p:cNvPr>
-              <p:cNvSpPr txBox="1"/>
-              <p:nvPr/>
-            </p:nvSpPr>
-            <p:spPr>
-              <a:xfrm>
-                <a:off x="5394680" y="3392649"/>
-                <a:ext cx="380232" cy="261610"/>
-              </a:xfrm>
-              <a:prstGeom prst="rect">
-                <a:avLst/>
-              </a:prstGeom>
-              <a:noFill/>
-            </p:spPr>
-            <p:txBody>
-              <a:bodyPr wrap="none" rtlCol="0">
-                <a:spAutoFit/>
-              </a:bodyPr>
-              <a:lstStyle/>
-              <a:p>
-                <a:r>
-                  <a:rPr lang="el-GR" sz="1100" dirty="0"/>
-                  <a:t>β</a:t>
-                </a:r>
-                <a:r>
-                  <a:rPr lang="en-US" sz="1100" dirty="0"/>
-                  <a:t>_r</a:t>
-                </a:r>
-                <a:endParaRPr lang="nl-NL" sz="1100" dirty="0"/>
-              </a:p>
-            </p:txBody>
-          </p:sp>
-          <p:sp>
-            <p:nvSpPr>
-              <p:cNvPr id="65" name="TextBox 64">
-                <a:extLst>
-                  <a:ext uri="{FF2B5EF4-FFF2-40B4-BE49-F238E27FC236}">
-                    <a16:creationId xmlns:a16="http://schemas.microsoft.com/office/drawing/2014/main" id="{6055B9A9-49F3-7477-D4E5-8ED50435C55D}"/>
-                  </a:ext>
-                </a:extLst>
-              </p:cNvPr>
-              <p:cNvSpPr txBox="1"/>
-              <p:nvPr/>
-            </p:nvSpPr>
-            <p:spPr>
-              <a:xfrm>
-                <a:off x="4896660" y="2773692"/>
-                <a:ext cx="369012" cy="261610"/>
-              </a:xfrm>
-              <a:prstGeom prst="rect">
-                <a:avLst/>
-              </a:prstGeom>
-              <a:noFill/>
-            </p:spPr>
-            <p:txBody>
-              <a:bodyPr wrap="none" rtlCol="0">
-                <a:spAutoFit/>
-              </a:bodyPr>
-              <a:lstStyle/>
-              <a:p>
-                <a:r>
-                  <a:rPr lang="en-US" sz="1100" dirty="0" err="1"/>
-                  <a:t>y_r</a:t>
-                </a:r>
-                <a:endParaRPr lang="nl-NL" sz="1100" dirty="0"/>
-              </a:p>
-            </p:txBody>
-          </p:sp>
-          <p:sp>
-            <p:nvSpPr>
-              <p:cNvPr id="66" name="TextBox 65">
-                <a:extLst>
-                  <a:ext uri="{FF2B5EF4-FFF2-40B4-BE49-F238E27FC236}">
-                    <a16:creationId xmlns:a16="http://schemas.microsoft.com/office/drawing/2014/main" id="{DA85648C-C627-34B1-88D9-227CAFCF3F95}"/>
-                  </a:ext>
-                </a:extLst>
-              </p:cNvPr>
-              <p:cNvSpPr txBox="1"/>
-              <p:nvPr/>
-            </p:nvSpPr>
-            <p:spPr>
-              <a:xfrm>
-                <a:off x="4526813" y="2239109"/>
-                <a:ext cx="317716" cy="261610"/>
-              </a:xfrm>
-              <a:prstGeom prst="rect">
-                <a:avLst/>
-              </a:prstGeom>
-              <a:noFill/>
-            </p:spPr>
-            <p:txBody>
-              <a:bodyPr wrap="none" rtlCol="0">
-                <a:spAutoFit/>
-              </a:bodyPr>
-              <a:lstStyle/>
-              <a:p>
-                <a:r>
-                  <a:rPr lang="en-US" sz="1100" dirty="0"/>
-                  <a:t>ST</a:t>
-                </a:r>
-                <a:endParaRPr lang="nl-NL" sz="1100" dirty="0"/>
-              </a:p>
-            </p:txBody>
-          </p:sp>
-        </p:grpSp>
+            <a:prstGeom prst="rect">
+              <a:avLst/>
+            </a:prstGeom>
+            <a:noFill/>
+          </p:spPr>
+          <p:txBody>
+            <a:bodyPr wrap="none" rtlCol="0">
+              <a:spAutoFit/>
+            </a:bodyPr>
+            <a:lstStyle/>
+            <a:p>
+              <a:r>
+                <a:rPr lang="en-US" sz="1100" dirty="0"/>
+                <a:t>P3_r</a:t>
+              </a:r>
+              <a:endParaRPr lang="nl-NL" sz="1100" dirty="0"/>
+            </a:p>
+          </p:txBody>
+        </p:sp>
+        <p:sp>
+          <p:nvSpPr>
+            <p:cNvPr id="81" name="TextBox 80">
+              <a:extLst>
+                <a:ext uri="{FF2B5EF4-FFF2-40B4-BE49-F238E27FC236}">
+                  <a16:creationId xmlns:a16="http://schemas.microsoft.com/office/drawing/2014/main" id="{EBF025F5-359A-1678-7D69-DC6E140EBE4A}"/>
+                </a:ext>
+              </a:extLst>
+            </p:cNvPr>
+            <p:cNvSpPr txBox="1"/>
+            <p:nvPr/>
+          </p:nvSpPr>
+          <p:spPr>
+            <a:xfrm>
+              <a:off x="2929206" y="3495897"/>
+              <a:ext cx="431528" cy="261610"/>
+            </a:xfrm>
+            <a:prstGeom prst="rect">
+              <a:avLst/>
+            </a:prstGeom>
+            <a:noFill/>
+          </p:spPr>
+          <p:txBody>
+            <a:bodyPr wrap="none" rtlCol="0">
+              <a:spAutoFit/>
+            </a:bodyPr>
+            <a:lstStyle/>
+            <a:p>
+              <a:r>
+                <a:rPr lang="en-US" sz="1100" dirty="0"/>
+                <a:t>P1_l</a:t>
+              </a:r>
+              <a:endParaRPr lang="nl-NL" sz="1100" dirty="0"/>
+            </a:p>
+          </p:txBody>
+        </p:sp>
+        <p:sp>
+          <p:nvSpPr>
+            <p:cNvPr id="82" name="TextBox 81">
+              <a:extLst>
+                <a:ext uri="{FF2B5EF4-FFF2-40B4-BE49-F238E27FC236}">
+                  <a16:creationId xmlns:a16="http://schemas.microsoft.com/office/drawing/2014/main" id="{4640811B-6D14-3021-DCA0-2A7A42B3FAF4}"/>
+                </a:ext>
+              </a:extLst>
+            </p:cNvPr>
+            <p:cNvSpPr txBox="1"/>
+            <p:nvPr/>
+          </p:nvSpPr>
+          <p:spPr>
+            <a:xfrm>
+              <a:off x="4241927" y="4564325"/>
+              <a:ext cx="431528" cy="261610"/>
+            </a:xfrm>
+            <a:prstGeom prst="rect">
+              <a:avLst/>
+            </a:prstGeom>
+            <a:noFill/>
+          </p:spPr>
+          <p:txBody>
+            <a:bodyPr wrap="none" rtlCol="0">
+              <a:spAutoFit/>
+            </a:bodyPr>
+            <a:lstStyle/>
+            <a:p>
+              <a:r>
+                <a:rPr lang="en-US" sz="1100" dirty="0"/>
+                <a:t>P2_l</a:t>
+              </a:r>
+            </a:p>
+          </p:txBody>
+        </p:sp>
+        <p:sp>
+          <p:nvSpPr>
+            <p:cNvPr id="83" name="TextBox 82">
+              <a:extLst>
+                <a:ext uri="{FF2B5EF4-FFF2-40B4-BE49-F238E27FC236}">
+                  <a16:creationId xmlns:a16="http://schemas.microsoft.com/office/drawing/2014/main" id="{E027964F-96F9-E80B-1AFE-7D6E24CE555C}"/>
+                </a:ext>
+              </a:extLst>
+            </p:cNvPr>
+            <p:cNvSpPr txBox="1"/>
+            <p:nvPr/>
+          </p:nvSpPr>
+          <p:spPr>
+            <a:xfrm>
+              <a:off x="5183922" y="3495897"/>
+              <a:ext cx="899360" cy="261610"/>
+            </a:xfrm>
+            <a:prstGeom prst="rect">
+              <a:avLst/>
+            </a:prstGeom>
+            <a:noFill/>
+          </p:spPr>
+          <p:txBody>
+            <a:bodyPr wrap="square" rtlCol="0">
+              <a:spAutoFit/>
+            </a:bodyPr>
+            <a:lstStyle/>
+            <a:p>
+              <a:r>
+                <a:rPr lang="en-US" sz="1100" dirty="0"/>
+                <a:t>P3_r</a:t>
+              </a:r>
+              <a:endParaRPr lang="nl-NL" sz="1100" dirty="0"/>
+            </a:p>
+          </p:txBody>
+        </p:sp>
       </p:grpSp>
     </p:spTree>
     <p:extLst>

</xml_diff>

<commit_message>
alle plaatjes kloppen nu, extra simplified data
</commit_message>
<xml_diff>
--- a/Report/Pictures/Schematics.pptx
+++ b/Report/Pictures/Schematics.pptx
@@ -208,7 +208,7 @@
           <a:p>
             <a:fld id="{8CAC89FC-C79C-4399-A322-FB5BD69CFCC8}" type="datetimeFigureOut">
               <a:rPr lang="nl-NL" smtClean="0"/>
-              <a:t>29-6-2022</a:t>
+              <a:t>30-6-2022</a:t>
             </a:fld>
             <a:endParaRPr lang="nl-NL"/>
           </a:p>
@@ -625,7 +625,7 @@
           <a:p>
             <a:fld id="{B7E8F05A-78F2-4247-8D53-7D4C0302F900}" type="datetimeFigureOut">
               <a:rPr lang="nl-NL" smtClean="0"/>
-              <a:t>29-6-2022</a:t>
+              <a:t>30-6-2022</a:t>
             </a:fld>
             <a:endParaRPr lang="nl-NL"/>
           </a:p>
@@ -825,7 +825,7 @@
           <a:p>
             <a:fld id="{B7E8F05A-78F2-4247-8D53-7D4C0302F900}" type="datetimeFigureOut">
               <a:rPr lang="nl-NL" smtClean="0"/>
-              <a:t>29-6-2022</a:t>
+              <a:t>30-6-2022</a:t>
             </a:fld>
             <a:endParaRPr lang="nl-NL"/>
           </a:p>
@@ -1035,7 +1035,7 @@
           <a:p>
             <a:fld id="{B7E8F05A-78F2-4247-8D53-7D4C0302F900}" type="datetimeFigureOut">
               <a:rPr lang="nl-NL" smtClean="0"/>
-              <a:t>29-6-2022</a:t>
+              <a:t>30-6-2022</a:t>
             </a:fld>
             <a:endParaRPr lang="nl-NL"/>
           </a:p>
@@ -1235,7 +1235,7 @@
           <a:p>
             <a:fld id="{B7E8F05A-78F2-4247-8D53-7D4C0302F900}" type="datetimeFigureOut">
               <a:rPr lang="nl-NL" smtClean="0"/>
-              <a:t>29-6-2022</a:t>
+              <a:t>30-6-2022</a:t>
             </a:fld>
             <a:endParaRPr lang="nl-NL"/>
           </a:p>
@@ -1511,7 +1511,7 @@
           <a:p>
             <a:fld id="{B7E8F05A-78F2-4247-8D53-7D4C0302F900}" type="datetimeFigureOut">
               <a:rPr lang="nl-NL" smtClean="0"/>
-              <a:t>29-6-2022</a:t>
+              <a:t>30-6-2022</a:t>
             </a:fld>
             <a:endParaRPr lang="nl-NL"/>
           </a:p>
@@ -1779,7 +1779,7 @@
           <a:p>
             <a:fld id="{B7E8F05A-78F2-4247-8D53-7D4C0302F900}" type="datetimeFigureOut">
               <a:rPr lang="nl-NL" smtClean="0"/>
-              <a:t>29-6-2022</a:t>
+              <a:t>30-6-2022</a:t>
             </a:fld>
             <a:endParaRPr lang="nl-NL"/>
           </a:p>
@@ -2194,7 +2194,7 @@
           <a:p>
             <a:fld id="{B7E8F05A-78F2-4247-8D53-7D4C0302F900}" type="datetimeFigureOut">
               <a:rPr lang="nl-NL" smtClean="0"/>
-              <a:t>29-6-2022</a:t>
+              <a:t>30-6-2022</a:t>
             </a:fld>
             <a:endParaRPr lang="nl-NL"/>
           </a:p>
@@ -2336,7 +2336,7 @@
           <a:p>
             <a:fld id="{B7E8F05A-78F2-4247-8D53-7D4C0302F900}" type="datetimeFigureOut">
               <a:rPr lang="nl-NL" smtClean="0"/>
-              <a:t>29-6-2022</a:t>
+              <a:t>30-6-2022</a:t>
             </a:fld>
             <a:endParaRPr lang="nl-NL"/>
           </a:p>
@@ -2449,7 +2449,7 @@
           <a:p>
             <a:fld id="{B7E8F05A-78F2-4247-8D53-7D4C0302F900}" type="datetimeFigureOut">
               <a:rPr lang="nl-NL" smtClean="0"/>
-              <a:t>29-6-2022</a:t>
+              <a:t>30-6-2022</a:t>
             </a:fld>
             <a:endParaRPr lang="nl-NL"/>
           </a:p>
@@ -2762,7 +2762,7 @@
           <a:p>
             <a:fld id="{B7E8F05A-78F2-4247-8D53-7D4C0302F900}" type="datetimeFigureOut">
               <a:rPr lang="nl-NL" smtClean="0"/>
-              <a:t>29-6-2022</a:t>
+              <a:t>30-6-2022</a:t>
             </a:fld>
             <a:endParaRPr lang="nl-NL"/>
           </a:p>
@@ -3051,7 +3051,7 @@
           <a:p>
             <a:fld id="{B7E8F05A-78F2-4247-8D53-7D4C0302F900}" type="datetimeFigureOut">
               <a:rPr lang="nl-NL" smtClean="0"/>
-              <a:t>29-6-2022</a:t>
+              <a:t>30-6-2022</a:t>
             </a:fld>
             <a:endParaRPr lang="nl-NL"/>
           </a:p>
@@ -3294,7 +3294,7 @@
           <a:p>
             <a:fld id="{B7E8F05A-78F2-4247-8D53-7D4C0302F900}" type="datetimeFigureOut">
               <a:rPr lang="nl-NL" smtClean="0"/>
-              <a:t>29-6-2022</a:t>
+              <a:t>30-6-2022</a:t>
             </a:fld>
             <a:endParaRPr lang="nl-NL"/>
           </a:p>
@@ -5628,8 +5628,8 @@
                 </p:nvCxnSpPr>
                 <p:spPr>
                   <a:xfrm flipH="1">
-                    <a:off x="4891390" y="1823506"/>
-                    <a:ext cx="781899" cy="12085"/>
+                    <a:off x="4891390" y="1835591"/>
+                    <a:ext cx="711782" cy="0"/>
                   </a:xfrm>
                   <a:prstGeom prst="line">
                     <a:avLst/>
@@ -6649,8 +6649,8 @@
                 </p:nvCxnSpPr>
                 <p:spPr>
                   <a:xfrm flipH="1">
-                    <a:off x="4891390" y="1823506"/>
-                    <a:ext cx="781899" cy="12085"/>
+                    <a:off x="4891390" y="1835591"/>
+                    <a:ext cx="711786" cy="0"/>
                   </a:xfrm>
                   <a:prstGeom prst="line">
                     <a:avLst/>

</xml_diff>